<commit_message>
Gradient Boost agragegado y ROC curves de comparación
</commit_message>
<xml_diff>
--- a/Data_Mining.pptx
+++ b/Data_Mining.pptx
@@ -17,6 +17,7 @@
     <p:sldId id="264" r:id="rId11"/>
     <p:sldId id="265" r:id="rId12"/>
     <p:sldId id="266" r:id="rId13"/>
+    <p:sldId id="269" r:id="rId14"/>
   </p:sldIdLst>
   <p:sldSz cx="12192000" cy="6858000"/>
   <p:notesSz cx="6858000" cy="9144000"/>
@@ -115,6 +116,11 @@
       </a:defRPr>
     </a:lvl9pPr>
   </p:defaultTextStyle>
+  <p:extLst>
+    <p:ext uri="{EFAFB233-063F-42B5-8137-9DF3F51BA10A}">
+      <p15:sldGuideLst xmlns:p15="http://schemas.microsoft.com/office/powerpoint/2012/main"/>
+    </p:ext>
+  </p:extLst>
 </p:presentation>
 </file>
 
@@ -2681,7 +2687,7 @@
 <dgm:dataModel xmlns:dgm="http://schemas.openxmlformats.org/drawingml/2006/diagram" xmlns:a="http://schemas.openxmlformats.org/drawingml/2006/main">
   <dgm:ptLst>
     <dgm:pt modelId="{09950DAC-56CD-4A2D-BD10-7B54B10BF829}" type="doc">
-      <dgm:prSet loTypeId="urn:microsoft.com/office/officeart/2005/8/layout/matrix2" loCatId="matrix" qsTypeId="urn:microsoft.com/office/officeart/2005/8/quickstyle/simple4" qsCatId="simple" csTypeId="urn:microsoft.com/office/officeart/2005/8/colors/colorful5" csCatId="colorful"/>
+      <dgm:prSet loTypeId="urn:microsoft.com/office/officeart/2005/8/layout/matrix2" loCatId="matrix" qsTypeId="urn:microsoft.com/office/officeart/2005/8/quickstyle/simple4" qsCatId="simple" csTypeId="urn:microsoft.com/office/officeart/2005/8/colors/colorful5" csCatId="colorful" phldr="1"/>
       <dgm:spPr/>
       <dgm:t>
         <a:bodyPr/>
@@ -2773,10 +2779,14 @@
         <a:lstStyle/>
         <a:p>
           <a:r>
-            <a:rPr lang="es-EC"/>
-            <a:t>Ridge Regression</a:t>
+            <a:rPr lang="es-EC" dirty="0"/>
+            <a:t>Ridge </a:t>
           </a:r>
-          <a:endParaRPr lang="en-US"/>
+          <a:r>
+            <a:rPr lang="es-EC" dirty="0" err="1"/>
+            <a:t>Regression</a:t>
+          </a:r>
+          <a:endParaRPr lang="en-US" dirty="0"/>
         </a:p>
       </dgm:t>
     </dgm:pt>
@@ -2810,10 +2820,14 @@
         <a:lstStyle/>
         <a:p>
           <a:r>
-            <a:rPr lang="es-EC"/>
-            <a:t>Random Forest</a:t>
+            <a:rPr lang="es-EC" dirty="0" err="1"/>
+            <a:t>Random</a:t>
           </a:r>
-          <a:endParaRPr lang="en-US"/>
+          <a:r>
+            <a:rPr lang="es-EC" dirty="0"/>
+            <a:t> Forest</a:t>
+          </a:r>
+          <a:endParaRPr lang="en-US" dirty="0"/>
         </a:p>
       </dgm:t>
     </dgm:pt>
@@ -2838,6 +2852,50 @@
           <a:endParaRPr lang="en-US"/>
         </a:p>
       </dgm:t>
+    </dgm:pt>
+    <dgm:pt modelId="{F5EF9AE9-C8B2-4A9F-8EC0-966679418933}">
+      <dgm:prSet/>
+      <dgm:spPr/>
+      <dgm:t>
+        <a:bodyPr/>
+        <a:lstStyle/>
+        <a:p>
+          <a:r>
+            <a:rPr lang="en-US" dirty="0"/>
+            <a:t>Ensemble Algorithms</a:t>
+          </a:r>
+        </a:p>
+      </dgm:t>
+    </dgm:pt>
+    <dgm:pt modelId="{945AEB05-5E40-4592-9AB6-6B95025500A7}" type="parTrans" cxnId="{C46F0A14-270F-4BA1-AA1D-F78077FC307D}">
+      <dgm:prSet/>
+      <dgm:spPr/>
+    </dgm:pt>
+    <dgm:pt modelId="{81D3326D-E121-4608-BB54-0C7C7315F751}" type="sibTrans" cxnId="{C46F0A14-270F-4BA1-AA1D-F78077FC307D}">
+      <dgm:prSet/>
+      <dgm:spPr/>
+    </dgm:pt>
+    <dgm:pt modelId="{03E0F1C5-43E0-443D-948E-0791400BEAA9}">
+      <dgm:prSet/>
+      <dgm:spPr/>
+      <dgm:t>
+        <a:bodyPr/>
+        <a:lstStyle/>
+        <a:p>
+          <a:r>
+            <a:rPr lang="en-US" dirty="0"/>
+            <a:t>Gradient Boost</a:t>
+          </a:r>
+        </a:p>
+      </dgm:t>
+    </dgm:pt>
+    <dgm:pt modelId="{D73FE059-5672-4E8F-A66D-9EB47BA62DBC}" type="parTrans" cxnId="{55A3C8C1-E4F7-4DF1-AC22-E65AB7A6266B}">
+      <dgm:prSet/>
+      <dgm:spPr/>
+    </dgm:pt>
+    <dgm:pt modelId="{90D9F2DC-6BE7-47A1-9E58-22FBD41A597F}" type="sibTrans" cxnId="{55A3C8C1-E4F7-4DF1-AC22-E65AB7A6266B}">
+      <dgm:prSet/>
+      <dgm:spPr/>
     </dgm:pt>
     <dgm:pt modelId="{1D34B2E3-678E-4D84-BB67-038B4FEB5F8C}" type="pres">
       <dgm:prSet presAssocID="{09950DAC-56CD-4A2D-BD10-7B54B10BF829}" presName="matrix" presStyleCnt="0">
@@ -2895,15 +2953,19 @@
     </dgm:pt>
   </dgm:ptLst>
   <dgm:cxnLst>
+    <dgm:cxn modelId="{2FAB8908-2194-4A3E-A1B0-849F511EB9FF}" type="presOf" srcId="{03E0F1C5-43E0-443D-948E-0791400BEAA9}" destId="{FDDF90B1-E10C-42E4-BBF9-830853B753A1}" srcOrd="0" destOrd="2" presId="urn:microsoft.com/office/officeart/2005/8/layout/matrix2"/>
+    <dgm:cxn modelId="{C46F0A14-270F-4BA1-AA1D-F78077FC307D}" srcId="{09950DAC-56CD-4A2D-BD10-7B54B10BF829}" destId="{F5EF9AE9-C8B2-4A9F-8EC0-966679418933}" srcOrd="3" destOrd="0" parTransId="{945AEB05-5E40-4592-9AB6-6B95025500A7}" sibTransId="{81D3326D-E121-4608-BB54-0C7C7315F751}"/>
     <dgm:cxn modelId="{7C9C7D22-F70E-443E-A894-0C20DCF9BC74}" type="presOf" srcId="{F25F8684-C691-4C28-A5EA-B43FB1A52EDB}" destId="{AA36DF13-2785-49C0-BD9A-6AAF3131B296}" srcOrd="0" destOrd="0" presId="urn:microsoft.com/office/officeart/2005/8/layout/matrix2"/>
+    <dgm:cxn modelId="{C19E0339-2C81-42DE-80A3-4CB653731BCF}" type="presOf" srcId="{F5EF9AE9-C8B2-4A9F-8EC0-966679418933}" destId="{FDDF90B1-E10C-42E4-BBF9-830853B753A1}" srcOrd="0" destOrd="0" presId="urn:microsoft.com/office/officeart/2005/8/layout/matrix2"/>
     <dgm:cxn modelId="{C9879549-48C3-4E0F-A3C1-52A166191D70}" srcId="{09950DAC-56CD-4A2D-BD10-7B54B10BF829}" destId="{F25F8684-C691-4C28-A5EA-B43FB1A52EDB}" srcOrd="2" destOrd="0" parTransId="{3FFD8664-AB2C-454F-A8C6-B03CEC81ACDD}" sibTransId="{60B05513-5D66-4CF4-B5E5-9A2A08498F0F}"/>
     <dgm:cxn modelId="{759BC36E-30E8-4D2A-9EFF-4F8365197A01}" type="presOf" srcId="{4FABAB07-435B-467D-923E-FCACE2109EA5}" destId="{96122406-FE11-4025-9BC5-4FF80D6124F2}" srcOrd="0" destOrd="0" presId="urn:microsoft.com/office/officeart/2005/8/layout/matrix2"/>
     <dgm:cxn modelId="{AF1E3450-9007-472A-981E-5AB5D1AE331F}" type="presOf" srcId="{6292C131-E5E5-4C9A-81BE-B9D312C0C450}" destId="{B04E7A05-117F-45CD-9958-8D5D6A8721E6}" srcOrd="0" destOrd="0" presId="urn:microsoft.com/office/officeart/2005/8/layout/matrix2"/>
     <dgm:cxn modelId="{383BBD53-1DE5-410E-A895-23973A59F116}" type="presOf" srcId="{09950DAC-56CD-4A2D-BD10-7B54B10BF829}" destId="{1D34B2E3-678E-4D84-BB67-038B4FEB5F8C}" srcOrd="0" destOrd="0" presId="urn:microsoft.com/office/officeart/2005/8/layout/matrix2"/>
     <dgm:cxn modelId="{CF53948D-201E-464A-B667-53764565157C}" srcId="{09950DAC-56CD-4A2D-BD10-7B54B10BF829}" destId="{6292C131-E5E5-4C9A-81BE-B9D312C0C450}" srcOrd="1" destOrd="0" parTransId="{842F4E5E-F267-46C7-9DAD-2E60B8B4CE12}" sibTransId="{71A474F5-1C61-4D39-93DD-133EBE4051D2}"/>
-    <dgm:cxn modelId="{A1EDEC98-A3B5-402F-BB4C-BF54569F1FA7}" type="presOf" srcId="{3D41DB0A-C920-486C-9206-6FE450251810}" destId="{FDDF90B1-E10C-42E4-BBF9-830853B753A1}" srcOrd="0" destOrd="0" presId="urn:microsoft.com/office/officeart/2005/8/layout/matrix2"/>
     <dgm:cxn modelId="{21D537C1-86F0-4800-95E2-835FBF0894C3}" srcId="{09950DAC-56CD-4A2D-BD10-7B54B10BF829}" destId="{4FABAB07-435B-467D-923E-FCACE2109EA5}" srcOrd="0" destOrd="0" parTransId="{E37E3AD2-FC4D-4216-9282-8D93855A3F80}" sibTransId="{592AA0D0-F966-40DF-B8F7-104F999EB77B}"/>
-    <dgm:cxn modelId="{7D9FB7DF-B6A1-4ABE-9311-60EF1367821C}" srcId="{09950DAC-56CD-4A2D-BD10-7B54B10BF829}" destId="{3D41DB0A-C920-486C-9206-6FE450251810}" srcOrd="3" destOrd="0" parTransId="{DC86ECBD-3829-4150-8939-D831ACF1BDB6}" sibTransId="{EA9C1DBF-56D8-4831-B30D-C590D68F2610}"/>
+    <dgm:cxn modelId="{7F2A5DC1-299B-4409-BA81-BC073FBD71F9}" type="presOf" srcId="{3D41DB0A-C920-486C-9206-6FE450251810}" destId="{FDDF90B1-E10C-42E4-BBF9-830853B753A1}" srcOrd="0" destOrd="1" presId="urn:microsoft.com/office/officeart/2005/8/layout/matrix2"/>
+    <dgm:cxn modelId="{55A3C8C1-E4F7-4DF1-AC22-E65AB7A6266B}" srcId="{F5EF9AE9-C8B2-4A9F-8EC0-966679418933}" destId="{03E0F1C5-43E0-443D-948E-0791400BEAA9}" srcOrd="1" destOrd="0" parTransId="{D73FE059-5672-4E8F-A66D-9EB47BA62DBC}" sibTransId="{90D9F2DC-6BE7-47A1-9E58-22FBD41A597F}"/>
+    <dgm:cxn modelId="{7D9FB7DF-B6A1-4ABE-9311-60EF1367821C}" srcId="{F5EF9AE9-C8B2-4A9F-8EC0-966679418933}" destId="{3D41DB0A-C920-486C-9206-6FE450251810}" srcOrd="0" destOrd="0" parTransId="{DC86ECBD-3829-4150-8939-D831ACF1BDB6}" sibTransId="{EA9C1DBF-56D8-4831-B30D-C590D68F2610}"/>
     <dgm:cxn modelId="{3BE288CC-BC4B-4F4E-8FE5-6BDD347316EC}" type="presParOf" srcId="{1D34B2E3-678E-4D84-BB67-038B4FEB5F8C}" destId="{EA0BEAAB-2B48-4018-9720-2AD5E0AAA17E}" srcOrd="0" destOrd="0" presId="urn:microsoft.com/office/officeart/2005/8/layout/matrix2"/>
     <dgm:cxn modelId="{A4F8D39F-80BD-4933-BCB7-099CC777B8DB}" type="presParOf" srcId="{1D34B2E3-678E-4D84-BB67-038B4FEB5F8C}" destId="{96122406-FE11-4025-9BC5-4FF80D6124F2}" srcOrd="1" destOrd="0" presId="urn:microsoft.com/office/officeart/2005/8/layout/matrix2"/>
     <dgm:cxn modelId="{A5366FCB-6435-419D-9D45-622E7737E89D}" type="presParOf" srcId="{1D34B2E3-678E-4D84-BB67-038B4FEB5F8C}" destId="{B04E7A05-117F-45CD-9958-8D5D6A8721E6}" srcOrd="2" destOrd="0" presId="urn:microsoft.com/office/officeart/2005/8/layout/matrix2"/>
@@ -2924,7 +2986,7 @@
 <dgm:dataModel xmlns:dgm="http://schemas.openxmlformats.org/drawingml/2006/diagram" xmlns:a="http://schemas.openxmlformats.org/drawingml/2006/main">
   <dgm:ptLst>
     <dgm:pt modelId="{C6275379-EE9C-4DE8-9EC6-076566B001ED}" type="doc">
-      <dgm:prSet loTypeId="urn:microsoft.com/office/officeart/2005/8/layout/vList2" loCatId="list" qsTypeId="urn:microsoft.com/office/officeart/2005/8/quickstyle/simple2" qsCatId="simple" csTypeId="urn:microsoft.com/office/officeart/2005/8/colors/colorful5" csCatId="colorful"/>
+      <dgm:prSet loTypeId="urn:microsoft.com/office/officeart/2005/8/layout/vList2" loCatId="list" qsTypeId="urn:microsoft.com/office/officeart/2005/8/quickstyle/simple2" qsCatId="simple" csTypeId="urn:microsoft.com/office/officeart/2005/8/colors/colorful5" csCatId="colorful" phldr="1"/>
       <dgm:spPr/>
       <dgm:t>
         <a:bodyPr/>
@@ -3381,14 +3443,14 @@
         <a:lstStyle/>
         <a:p>
           <a:r>
-            <a:rPr lang="es-EC"/>
+            <a:rPr lang="es-EC" dirty="0"/>
             <a:t>Test: </a:t>
           </a:r>
           <a:r>
-            <a:rPr lang="es-ES"/>
+            <a:rPr lang="es-ES" dirty="0"/>
             <a:t>0.8</a:t>
           </a:r>
-          <a:endParaRPr lang="en-US"/>
+          <a:endParaRPr lang="en-US" dirty="0"/>
         </a:p>
       </dgm:t>
     </dgm:pt>
@@ -3414,6 +3476,128 @@
         </a:p>
       </dgm:t>
     </dgm:pt>
+    <dgm:pt modelId="{7859DCD8-9BBB-49EB-A6BC-D2915DFC86A4}">
+      <dgm:prSet/>
+      <dgm:spPr/>
+      <dgm:t>
+        <a:bodyPr/>
+        <a:lstStyle/>
+        <a:p>
+          <a:r>
+            <a:rPr lang="en-US" dirty="0"/>
+            <a:t>Gradient Boost</a:t>
+          </a:r>
+        </a:p>
+      </dgm:t>
+    </dgm:pt>
+    <dgm:pt modelId="{C5327E43-F170-41A0-B7D0-6612AC841761}" type="parTrans" cxnId="{64963BDC-68C4-439D-A684-290F69187CC3}">
+      <dgm:prSet/>
+      <dgm:spPr/>
+      <dgm:t>
+        <a:bodyPr/>
+        <a:lstStyle/>
+        <a:p>
+          <a:endParaRPr lang="es-EC"/>
+        </a:p>
+      </dgm:t>
+    </dgm:pt>
+    <dgm:pt modelId="{37AA20C8-2120-43DD-9C2B-030856CAF290}" type="sibTrans" cxnId="{64963BDC-68C4-439D-A684-290F69187CC3}">
+      <dgm:prSet/>
+      <dgm:spPr/>
+      <dgm:t>
+        <a:bodyPr/>
+        <a:lstStyle/>
+        <a:p>
+          <a:endParaRPr lang="es-EC"/>
+        </a:p>
+      </dgm:t>
+    </dgm:pt>
+    <dgm:pt modelId="{AC83BD21-B24B-41BA-9720-8AA1141370C2}">
+      <dgm:prSet/>
+      <dgm:spPr/>
+      <dgm:t>
+        <a:bodyPr/>
+        <a:lstStyle/>
+        <a:p>
+          <a:r>
+            <a:rPr lang="en-US" dirty="0"/>
+            <a:t>Training: </a:t>
+          </a:r>
+          <a:r>
+            <a:rPr lang="es-EC" dirty="0">
+              <a:effectLst/>
+            </a:rPr>
+            <a:t>0.823809523809524</a:t>
+          </a:r>
+          <a:endParaRPr lang="en-US" dirty="0"/>
+        </a:p>
+      </dgm:t>
+    </dgm:pt>
+    <dgm:pt modelId="{9A7D78DD-72A2-4A3D-A783-DC66CB09DA95}" type="parTrans" cxnId="{3D3BD8F3-4526-4D85-BFED-6F17C97D00EC}">
+      <dgm:prSet/>
+      <dgm:spPr/>
+      <dgm:t>
+        <a:bodyPr/>
+        <a:lstStyle/>
+        <a:p>
+          <a:endParaRPr lang="es-EC"/>
+        </a:p>
+      </dgm:t>
+    </dgm:pt>
+    <dgm:pt modelId="{06EEBEF6-B959-4815-8D5B-5BDEEF7D2858}" type="sibTrans" cxnId="{3D3BD8F3-4526-4D85-BFED-6F17C97D00EC}">
+      <dgm:prSet/>
+      <dgm:spPr/>
+      <dgm:t>
+        <a:bodyPr/>
+        <a:lstStyle/>
+        <a:p>
+          <a:endParaRPr lang="es-EC"/>
+        </a:p>
+      </dgm:t>
+    </dgm:pt>
+    <dgm:pt modelId="{D8CE8E59-FD9C-4EA6-8F3F-74AFE649BA2C}">
+      <dgm:prSet/>
+      <dgm:spPr/>
+      <dgm:t>
+        <a:bodyPr/>
+        <a:lstStyle/>
+        <a:p>
+          <a:r>
+            <a:rPr lang="en-US" dirty="0"/>
+            <a:t>Test: </a:t>
+          </a:r>
+          <a:r>
+            <a:rPr lang="es-EC" dirty="0">
+              <a:effectLst/>
+            </a:rPr>
+            <a:t>0.783333333333333</a:t>
+          </a:r>
+          <a:endParaRPr lang="en-US" dirty="0"/>
+        </a:p>
+      </dgm:t>
+    </dgm:pt>
+    <dgm:pt modelId="{522C6A39-4B7B-407A-A599-55991556C4D4}" type="parTrans" cxnId="{69BB745F-227A-48FD-99CF-7689CF8AAF92}">
+      <dgm:prSet/>
+      <dgm:spPr/>
+      <dgm:t>
+        <a:bodyPr/>
+        <a:lstStyle/>
+        <a:p>
+          <a:endParaRPr lang="es-EC"/>
+        </a:p>
+      </dgm:t>
+    </dgm:pt>
+    <dgm:pt modelId="{73887F2E-F304-45A9-837E-2F8F0972B4D1}" type="sibTrans" cxnId="{69BB745F-227A-48FD-99CF-7689CF8AAF92}">
+      <dgm:prSet/>
+      <dgm:spPr/>
+      <dgm:t>
+        <a:bodyPr/>
+        <a:lstStyle/>
+        <a:p>
+          <a:endParaRPr lang="es-EC"/>
+        </a:p>
+      </dgm:t>
+    </dgm:pt>
     <dgm:pt modelId="{601AFD20-A078-49E4-B20A-53DE7E450E21}" type="pres">
       <dgm:prSet presAssocID="{C6275379-EE9C-4DE8-9EC6-076566B001ED}" presName="linear" presStyleCnt="0">
         <dgm:presLayoutVars>
@@ -3424,7 +3608,7 @@
       <dgm:spPr/>
     </dgm:pt>
     <dgm:pt modelId="{9745CFB2-3913-4134-9415-746AF8C93722}" type="pres">
-      <dgm:prSet presAssocID="{E383FC6B-5403-481A-A4AA-D8B0198F43F1}" presName="parentText" presStyleLbl="node1" presStyleIdx="0" presStyleCnt="4">
+      <dgm:prSet presAssocID="{E383FC6B-5403-481A-A4AA-D8B0198F43F1}" presName="parentText" presStyleLbl="node1" presStyleIdx="0" presStyleCnt="5">
         <dgm:presLayoutVars>
           <dgm:chMax val="0"/>
           <dgm:bulletEnabled val="1"/>
@@ -3433,7 +3617,7 @@
       <dgm:spPr/>
     </dgm:pt>
     <dgm:pt modelId="{C4DFD3C5-312A-4589-8285-412C86C73C6E}" type="pres">
-      <dgm:prSet presAssocID="{E383FC6B-5403-481A-A4AA-D8B0198F43F1}" presName="childText" presStyleLbl="revTx" presStyleIdx="0" presStyleCnt="4">
+      <dgm:prSet presAssocID="{E383FC6B-5403-481A-A4AA-D8B0198F43F1}" presName="childText" presStyleLbl="revTx" presStyleIdx="0" presStyleCnt="5">
         <dgm:presLayoutVars>
           <dgm:bulletEnabled val="1"/>
         </dgm:presLayoutVars>
@@ -3441,7 +3625,7 @@
       <dgm:spPr/>
     </dgm:pt>
     <dgm:pt modelId="{A50FE496-705D-409F-A541-F4602DAF4AF1}" type="pres">
-      <dgm:prSet presAssocID="{D240271B-2F5E-4660-A2BA-77B032D7AD20}" presName="parentText" presStyleLbl="node1" presStyleIdx="1" presStyleCnt="4">
+      <dgm:prSet presAssocID="{D240271B-2F5E-4660-A2BA-77B032D7AD20}" presName="parentText" presStyleLbl="node1" presStyleIdx="1" presStyleCnt="5">
         <dgm:presLayoutVars>
           <dgm:chMax val="0"/>
           <dgm:bulletEnabled val="1"/>
@@ -3450,7 +3634,7 @@
       <dgm:spPr/>
     </dgm:pt>
     <dgm:pt modelId="{C0192D08-C55A-43A7-A4CF-9C7AD8427FF2}" type="pres">
-      <dgm:prSet presAssocID="{D240271B-2F5E-4660-A2BA-77B032D7AD20}" presName="childText" presStyleLbl="revTx" presStyleIdx="1" presStyleCnt="4">
+      <dgm:prSet presAssocID="{D240271B-2F5E-4660-A2BA-77B032D7AD20}" presName="childText" presStyleLbl="revTx" presStyleIdx="1" presStyleCnt="5">
         <dgm:presLayoutVars>
           <dgm:bulletEnabled val="1"/>
         </dgm:presLayoutVars>
@@ -3458,7 +3642,7 @@
       <dgm:spPr/>
     </dgm:pt>
     <dgm:pt modelId="{1CFB7155-92CA-4B0D-8CB1-5FE74A6FD99A}" type="pres">
-      <dgm:prSet presAssocID="{E0DF67F9-FE34-4ED1-8925-F09C6241E397}" presName="parentText" presStyleLbl="node1" presStyleIdx="2" presStyleCnt="4">
+      <dgm:prSet presAssocID="{E0DF67F9-FE34-4ED1-8925-F09C6241E397}" presName="parentText" presStyleLbl="node1" presStyleIdx="2" presStyleCnt="5">
         <dgm:presLayoutVars>
           <dgm:chMax val="0"/>
           <dgm:bulletEnabled val="1"/>
@@ -3467,7 +3651,7 @@
       <dgm:spPr/>
     </dgm:pt>
     <dgm:pt modelId="{40C9563D-5013-4EA5-B7DE-60878DCC8052}" type="pres">
-      <dgm:prSet presAssocID="{E0DF67F9-FE34-4ED1-8925-F09C6241E397}" presName="childText" presStyleLbl="revTx" presStyleIdx="2" presStyleCnt="4">
+      <dgm:prSet presAssocID="{E0DF67F9-FE34-4ED1-8925-F09C6241E397}" presName="childText" presStyleLbl="revTx" presStyleIdx="2" presStyleCnt="5">
         <dgm:presLayoutVars>
           <dgm:bulletEnabled val="1"/>
         </dgm:presLayoutVars>
@@ -3475,7 +3659,7 @@
       <dgm:spPr/>
     </dgm:pt>
     <dgm:pt modelId="{7F9190FB-913C-48EE-B8A8-0551C69AA14A}" type="pres">
-      <dgm:prSet presAssocID="{FF9A3F28-9EB2-482A-91FF-9A04FC444AF7}" presName="parentText" presStyleLbl="node1" presStyleIdx="3" presStyleCnt="4">
+      <dgm:prSet presAssocID="{FF9A3F28-9EB2-482A-91FF-9A04FC444AF7}" presName="parentText" presStyleLbl="node1" presStyleIdx="3" presStyleCnt="5">
         <dgm:presLayoutVars>
           <dgm:chMax val="0"/>
           <dgm:bulletEnabled val="1"/>
@@ -3484,7 +3668,24 @@
       <dgm:spPr/>
     </dgm:pt>
     <dgm:pt modelId="{D65FADB4-159F-4229-AAF8-33026A54354A}" type="pres">
-      <dgm:prSet presAssocID="{FF9A3F28-9EB2-482A-91FF-9A04FC444AF7}" presName="childText" presStyleLbl="revTx" presStyleIdx="3" presStyleCnt="4">
+      <dgm:prSet presAssocID="{FF9A3F28-9EB2-482A-91FF-9A04FC444AF7}" presName="childText" presStyleLbl="revTx" presStyleIdx="3" presStyleCnt="5">
+        <dgm:presLayoutVars>
+          <dgm:bulletEnabled val="1"/>
+        </dgm:presLayoutVars>
+      </dgm:prSet>
+      <dgm:spPr/>
+    </dgm:pt>
+    <dgm:pt modelId="{302FA4A1-2B1C-4A58-9189-CFB117B85584}" type="pres">
+      <dgm:prSet presAssocID="{7859DCD8-9BBB-49EB-A6BC-D2915DFC86A4}" presName="parentText" presStyleLbl="node1" presStyleIdx="4" presStyleCnt="5">
+        <dgm:presLayoutVars>
+          <dgm:chMax val="0"/>
+          <dgm:bulletEnabled val="1"/>
+        </dgm:presLayoutVars>
+      </dgm:prSet>
+      <dgm:spPr/>
+    </dgm:pt>
+    <dgm:pt modelId="{2CB7EDD1-635D-42FE-8184-6DDB9775137A}" type="pres">
+      <dgm:prSet presAssocID="{7859DCD8-9BBB-49EB-A6BC-D2915DFC86A4}" presName="childText" presStyleLbl="revTx" presStyleIdx="4" presStyleCnt="5">
         <dgm:presLayoutVars>
           <dgm:bulletEnabled val="1"/>
         </dgm:presLayoutVars>
@@ -3496,7 +3697,9 @@
     <dgm:cxn modelId="{AFA86309-8B36-401A-8FDE-4C97035B1B5D}" type="presOf" srcId="{15FF3761-24DF-4276-9482-34753322EB13}" destId="{C4DFD3C5-312A-4589-8285-412C86C73C6E}" srcOrd="0" destOrd="0" presId="urn:microsoft.com/office/officeart/2005/8/layout/vList2"/>
     <dgm:cxn modelId="{4F32CA28-466B-4949-B054-BC1456A1EF27}" type="presOf" srcId="{C6275379-EE9C-4DE8-9EC6-076566B001ED}" destId="{601AFD20-A078-49E4-B20A-53DE7E450E21}" srcOrd="0" destOrd="0" presId="urn:microsoft.com/office/officeart/2005/8/layout/vList2"/>
     <dgm:cxn modelId="{45BEB635-BCC1-4C30-BDA5-368F58FA8FB6}" srcId="{E0DF67F9-FE34-4ED1-8925-F09C6241E397}" destId="{F41D10B0-F5B1-49FC-BB4C-EC8090CBC898}" srcOrd="1" destOrd="0" parTransId="{B5959ACF-DE99-4715-9394-86B994D487BD}" sibTransId="{FEE3CADB-656E-4F12-97A2-BC8641B9872F}"/>
+    <dgm:cxn modelId="{F67EE736-6837-42C3-955E-84647BB29D3A}" type="presOf" srcId="{AC83BD21-B24B-41BA-9720-8AA1141370C2}" destId="{2CB7EDD1-635D-42FE-8184-6DDB9775137A}" srcOrd="0" destOrd="0" presId="urn:microsoft.com/office/officeart/2005/8/layout/vList2"/>
     <dgm:cxn modelId="{26FDD23D-A219-4615-9CAD-9AB394BA589D}" srcId="{FF9A3F28-9EB2-482A-91FF-9A04FC444AF7}" destId="{57AB11AD-C438-48B5-A716-A9CA9093C80D}" srcOrd="0" destOrd="0" parTransId="{14EF5556-49E6-4E80-BD07-165C07209B92}" sibTransId="{2E8BAFB1-FD74-4BD2-9DA5-93677A522971}"/>
+    <dgm:cxn modelId="{69BB745F-227A-48FD-99CF-7689CF8AAF92}" srcId="{7859DCD8-9BBB-49EB-A6BC-D2915DFC86A4}" destId="{D8CE8E59-FD9C-4EA6-8F3F-74AFE649BA2C}" srcOrd="1" destOrd="0" parTransId="{522C6A39-4B7B-407A-A599-55991556C4D4}" sibTransId="{73887F2E-F304-45A9-837E-2F8F0972B4D1}"/>
     <dgm:cxn modelId="{E6975E64-2678-4CA5-9A23-B977DDCA883E}" srcId="{E383FC6B-5403-481A-A4AA-D8B0198F43F1}" destId="{15FF3761-24DF-4276-9482-34753322EB13}" srcOrd="0" destOrd="0" parTransId="{E0134A48-B75B-473F-A574-B5FE256FA891}" sibTransId="{AEBF6939-C372-4480-9B41-9DF11C9BA680}"/>
     <dgm:cxn modelId="{03E2A445-AC4F-4989-A2B8-9A2D7C8998C3}" srcId="{D240271B-2F5E-4660-A2BA-77B032D7AD20}" destId="{CFCFB29A-504F-43A0-A947-DFF014A3AA01}" srcOrd="0" destOrd="0" parTransId="{E2DEFA9F-2F13-469E-9C3F-A2E3184D1F5F}" sibTransId="{D301B748-B569-4C16-9232-8EA602194C54}"/>
     <dgm:cxn modelId="{EFB9384C-6234-4532-BC31-81FC6FEB1E6A}" type="presOf" srcId="{CFCFB29A-504F-43A0-A947-DFF014A3AA01}" destId="{C0192D08-C55A-43A7-A4CF-9C7AD8427FF2}" srcOrd="0" destOrd="0" presId="urn:microsoft.com/office/officeart/2005/8/layout/vList2"/>
@@ -3508,6 +3711,7 @@
     <dgm:cxn modelId="{F289078A-DBE6-438E-9E95-EF27F4FAB3DC}" srcId="{C6275379-EE9C-4DE8-9EC6-076566B001ED}" destId="{E0DF67F9-FE34-4ED1-8925-F09C6241E397}" srcOrd="2" destOrd="0" parTransId="{9D178FE6-137A-4437-9240-B5A4BA956F26}" sibTransId="{66C6683E-CFB8-4C7F-98CB-2BE8D1808DC4}"/>
     <dgm:cxn modelId="{4D5DB48F-1D01-4896-903D-C6C64F7C91D8}" type="presOf" srcId="{D240271B-2F5E-4660-A2BA-77B032D7AD20}" destId="{A50FE496-705D-409F-A541-F4602DAF4AF1}" srcOrd="0" destOrd="0" presId="urn:microsoft.com/office/officeart/2005/8/layout/vList2"/>
     <dgm:cxn modelId="{59B193A5-67C1-4DD7-AC2E-2304E4FEBEE4}" srcId="{E0DF67F9-FE34-4ED1-8925-F09C6241E397}" destId="{F7557897-FD0B-4BC9-B1DD-DC8A1AC09B17}" srcOrd="0" destOrd="0" parTransId="{3AF808B7-0E8B-4CD0-88A9-BE76328BDF2B}" sibTransId="{0693508E-FC7F-405A-A5F2-39E25AC130C5}"/>
+    <dgm:cxn modelId="{35E4FEA5-B358-4B5E-BB94-15C0DBD1B3E8}" type="presOf" srcId="{D8CE8E59-FD9C-4EA6-8F3F-74AFE649BA2C}" destId="{2CB7EDD1-635D-42FE-8184-6DDB9775137A}" srcOrd="0" destOrd="1" presId="urn:microsoft.com/office/officeart/2005/8/layout/vList2"/>
     <dgm:cxn modelId="{18AD72AA-6CCD-4FFF-A04C-1109FB2AF74E}" srcId="{D240271B-2F5E-4660-A2BA-77B032D7AD20}" destId="{6A50F96E-AE3D-436A-945F-97D1591C7122}" srcOrd="1" destOrd="0" parTransId="{D96D7CA1-E2BF-4AFB-AF73-29663110A825}" sibTransId="{25CA9482-EB9E-432E-8810-CB19FC31E06D}"/>
     <dgm:cxn modelId="{7754B5AD-E678-48D6-BCBC-40BC9FFD2B2E}" srcId="{FF9A3F28-9EB2-482A-91FF-9A04FC444AF7}" destId="{BDDBBECB-40A7-478E-A260-722BD4AE93A4}" srcOrd="1" destOrd="0" parTransId="{33BDB16C-8944-499E-8D06-24978D9228F0}" sibTransId="{0C0A626F-99B6-4760-9A79-FCC5E9B04185}"/>
     <dgm:cxn modelId="{BD86A0B4-8B5D-4AC5-988D-0F74B5F6172F}" type="presOf" srcId="{6A50F96E-AE3D-436A-945F-97D1591C7122}" destId="{C0192D08-C55A-43A7-A4CF-9C7AD8427FF2}" srcOrd="0" destOrd="1" presId="urn:microsoft.com/office/officeart/2005/8/layout/vList2"/>
@@ -3517,6 +3721,9 @@
     <dgm:cxn modelId="{B07AB1C9-35A4-454E-A6F2-34C709EF7CC5}" type="presOf" srcId="{BDDBBECB-40A7-478E-A260-722BD4AE93A4}" destId="{D65FADB4-159F-4229-AAF8-33026A54354A}" srcOrd="0" destOrd="1" presId="urn:microsoft.com/office/officeart/2005/8/layout/vList2"/>
     <dgm:cxn modelId="{F69A21CA-D48F-444A-A21D-9ADB4DFE18A0}" srcId="{E383FC6B-5403-481A-A4AA-D8B0198F43F1}" destId="{95A05FFA-95D7-409E-93B0-20AD5784DCB3}" srcOrd="1" destOrd="0" parTransId="{5DBE7A8A-717C-4EE3-9DED-B507159CBBAC}" sibTransId="{524E3371-11DE-463E-83EC-8303411F4F2C}"/>
     <dgm:cxn modelId="{830790CB-5CEB-430A-B114-3F5ADE789165}" srcId="{C6275379-EE9C-4DE8-9EC6-076566B001ED}" destId="{FF9A3F28-9EB2-482A-91FF-9A04FC444AF7}" srcOrd="3" destOrd="0" parTransId="{1C962592-2AF4-4A5A-B21E-CCC86278060C}" sibTransId="{B3420562-099B-490E-BB6E-5FAE57F7C912}"/>
+    <dgm:cxn modelId="{53D3BFD5-C683-4269-9A8E-B40358B0DBB0}" type="presOf" srcId="{7859DCD8-9BBB-49EB-A6BC-D2915DFC86A4}" destId="{302FA4A1-2B1C-4A58-9189-CFB117B85584}" srcOrd="0" destOrd="0" presId="urn:microsoft.com/office/officeart/2005/8/layout/vList2"/>
+    <dgm:cxn modelId="{64963BDC-68C4-439D-A684-290F69187CC3}" srcId="{C6275379-EE9C-4DE8-9EC6-076566B001ED}" destId="{7859DCD8-9BBB-49EB-A6BC-D2915DFC86A4}" srcOrd="4" destOrd="0" parTransId="{C5327E43-F170-41A0-B7D0-6612AC841761}" sibTransId="{37AA20C8-2120-43DD-9C2B-030856CAF290}"/>
+    <dgm:cxn modelId="{3D3BD8F3-4526-4D85-BFED-6F17C97D00EC}" srcId="{7859DCD8-9BBB-49EB-A6BC-D2915DFC86A4}" destId="{AC83BD21-B24B-41BA-9720-8AA1141370C2}" srcOrd="0" destOrd="0" parTransId="{9A7D78DD-72A2-4A3D-A783-DC66CB09DA95}" sibTransId="{06EEBEF6-B959-4815-8D5B-5BDEEF7D2858}"/>
     <dgm:cxn modelId="{FF85CDF4-D760-40DE-A95D-B27ACC79DFAB}" srcId="{C6275379-EE9C-4DE8-9EC6-076566B001ED}" destId="{D240271B-2F5E-4660-A2BA-77B032D7AD20}" srcOrd="1" destOrd="0" parTransId="{92A7E070-981C-41BA-A9F9-C02FC8C76220}" sibTransId="{9D2E0223-692F-4560-886C-9CAB82BBF411}"/>
     <dgm:cxn modelId="{9694E2A3-349C-4B3C-B304-2AADC33C6D1F}" type="presParOf" srcId="{601AFD20-A078-49E4-B20A-53DE7E450E21}" destId="{9745CFB2-3913-4134-9415-746AF8C93722}" srcOrd="0" destOrd="0" presId="urn:microsoft.com/office/officeart/2005/8/layout/vList2"/>
     <dgm:cxn modelId="{22927DB5-3D3B-4BBA-ABC2-70971E8FA956}" type="presParOf" srcId="{601AFD20-A078-49E4-B20A-53DE7E450E21}" destId="{C4DFD3C5-312A-4589-8285-412C86C73C6E}" srcOrd="1" destOrd="0" presId="urn:microsoft.com/office/officeart/2005/8/layout/vList2"/>
@@ -3526,6 +3733,8 @@
     <dgm:cxn modelId="{13E15727-2647-40F7-A1D4-B8441085B909}" type="presParOf" srcId="{601AFD20-A078-49E4-B20A-53DE7E450E21}" destId="{40C9563D-5013-4EA5-B7DE-60878DCC8052}" srcOrd="5" destOrd="0" presId="urn:microsoft.com/office/officeart/2005/8/layout/vList2"/>
     <dgm:cxn modelId="{3AB4DC8B-9C96-4662-9318-B5C1A72F26C2}" type="presParOf" srcId="{601AFD20-A078-49E4-B20A-53DE7E450E21}" destId="{7F9190FB-913C-48EE-B8A8-0551C69AA14A}" srcOrd="6" destOrd="0" presId="urn:microsoft.com/office/officeart/2005/8/layout/vList2"/>
     <dgm:cxn modelId="{DA9794D9-84E1-4519-9C1A-2E88464D4B0C}" type="presParOf" srcId="{601AFD20-A078-49E4-B20A-53DE7E450E21}" destId="{D65FADB4-159F-4229-AAF8-33026A54354A}" srcOrd="7" destOrd="0" presId="urn:microsoft.com/office/officeart/2005/8/layout/vList2"/>
+    <dgm:cxn modelId="{F189635C-34AE-40D9-8954-E5F93B893C49}" type="presParOf" srcId="{601AFD20-A078-49E4-B20A-53DE7E450E21}" destId="{302FA4A1-2B1C-4A58-9189-CFB117B85584}" srcOrd="8" destOrd="0" presId="urn:microsoft.com/office/officeart/2005/8/layout/vList2"/>
+    <dgm:cxn modelId="{9CBDD41D-A0F6-430B-A204-1C7284DB200D}" type="presParOf" srcId="{601AFD20-A078-49E4-B20A-53DE7E450E21}" destId="{2CB7EDD1-635D-42FE-8184-6DDB9775137A}" srcOrd="9" destOrd="0" presId="urn:microsoft.com/office/officeart/2005/8/layout/vList2"/>
   </dgm:cxnLst>
   <dgm:bg/>
   <dgm:whole/>
@@ -4131,12 +4340,12 @@
         </a:fontRef>
       </dsp:style>
       <dsp:txBody>
-        <a:bodyPr spcFirstLastPara="0" vert="horz" wrap="square" lIns="125730" tIns="125730" rIns="125730" bIns="125730" numCol="1" spcCol="1270" anchor="ctr" anchorCtr="0">
+        <a:bodyPr spcFirstLastPara="0" vert="horz" wrap="square" lIns="102870" tIns="102870" rIns="102870" bIns="102870" numCol="1" spcCol="1270" anchor="ctr" anchorCtr="0">
           <a:noAutofit/>
         </a:bodyPr>
         <a:lstStyle/>
         <a:p>
-          <a:pPr marL="0" lvl="0" indent="0" algn="ctr" defTabSz="1466850">
+          <a:pPr marL="0" lvl="0" indent="0" algn="ctr" defTabSz="1200150">
             <a:lnSpc>
               <a:spcPct val="90000"/>
             </a:lnSpc>
@@ -4149,10 +4358,10 @@
             <a:buNone/>
           </a:pPr>
           <a:r>
-            <a:rPr lang="es-EC" sz="3300" kern="1200"/>
+            <a:rPr lang="es-EC" sz="2700" kern="1200"/>
             <a:t>Logistic Regression</a:t>
           </a:r>
-          <a:endParaRPr lang="en-US" sz="3300" kern="1200"/>
+          <a:endParaRPr lang="en-US" sz="2700" kern="1200"/>
         </a:p>
       </dsp:txBody>
       <dsp:txXfrm>
@@ -4231,12 +4440,12 @@
         </a:fontRef>
       </dsp:style>
       <dsp:txBody>
-        <a:bodyPr spcFirstLastPara="0" vert="horz" wrap="square" lIns="125730" tIns="125730" rIns="125730" bIns="125730" numCol="1" spcCol="1270" anchor="ctr" anchorCtr="0">
+        <a:bodyPr spcFirstLastPara="0" vert="horz" wrap="square" lIns="102870" tIns="102870" rIns="102870" bIns="102870" numCol="1" spcCol="1270" anchor="ctr" anchorCtr="0">
           <a:noAutofit/>
         </a:bodyPr>
         <a:lstStyle/>
         <a:p>
-          <a:pPr marL="0" lvl="0" indent="0" algn="ctr" defTabSz="1466850">
+          <a:pPr marL="0" lvl="0" indent="0" algn="ctr" defTabSz="1200150">
             <a:lnSpc>
               <a:spcPct val="90000"/>
             </a:lnSpc>
@@ -4249,10 +4458,10 @@
             <a:buNone/>
           </a:pPr>
           <a:r>
-            <a:rPr lang="es-EC" sz="3300" kern="1200"/>
+            <a:rPr lang="es-EC" sz="2700" kern="1200"/>
             <a:t>Linear Regression</a:t>
           </a:r>
-          <a:endParaRPr lang="en-US" sz="3300" kern="1200"/>
+          <a:endParaRPr lang="en-US" sz="2700" kern="1200"/>
         </a:p>
       </dsp:txBody>
       <dsp:txXfrm>
@@ -4331,12 +4540,12 @@
         </a:fontRef>
       </dsp:style>
       <dsp:txBody>
-        <a:bodyPr spcFirstLastPara="0" vert="horz" wrap="square" lIns="125730" tIns="125730" rIns="125730" bIns="125730" numCol="1" spcCol="1270" anchor="ctr" anchorCtr="0">
+        <a:bodyPr spcFirstLastPara="0" vert="horz" wrap="square" lIns="102870" tIns="102870" rIns="102870" bIns="102870" numCol="1" spcCol="1270" anchor="ctr" anchorCtr="0">
           <a:noAutofit/>
         </a:bodyPr>
         <a:lstStyle/>
         <a:p>
-          <a:pPr marL="0" lvl="0" indent="0" algn="ctr" defTabSz="1466850">
+          <a:pPr marL="0" lvl="0" indent="0" algn="ctr" defTabSz="1200150">
             <a:lnSpc>
               <a:spcPct val="90000"/>
             </a:lnSpc>
@@ -4349,10 +4558,14 @@
             <a:buNone/>
           </a:pPr>
           <a:r>
-            <a:rPr lang="es-EC" sz="3300" kern="1200"/>
-            <a:t>Ridge Regression</a:t>
+            <a:rPr lang="es-EC" sz="2700" kern="1200" dirty="0"/>
+            <a:t>Ridge </a:t>
           </a:r>
-          <a:endParaRPr lang="en-US" sz="3300" kern="1200"/>
+          <a:r>
+            <a:rPr lang="es-EC" sz="2700" kern="1200" dirty="0" err="1"/>
+            <a:t>Regression</a:t>
+          </a:r>
+          <a:endParaRPr lang="en-US" sz="2700" kern="1200" dirty="0"/>
         </a:p>
       </dsp:txBody>
       <dsp:txXfrm>
@@ -4431,12 +4644,12 @@
         </a:fontRef>
       </dsp:style>
       <dsp:txBody>
-        <a:bodyPr spcFirstLastPara="0" vert="horz" wrap="square" lIns="125730" tIns="125730" rIns="125730" bIns="125730" numCol="1" spcCol="1270" anchor="ctr" anchorCtr="0">
+        <a:bodyPr spcFirstLastPara="0" vert="horz" wrap="square" lIns="102870" tIns="102870" rIns="102870" bIns="102870" numCol="1" spcCol="1270" anchor="t" anchorCtr="0">
           <a:noAutofit/>
         </a:bodyPr>
         <a:lstStyle/>
         <a:p>
-          <a:pPr marL="0" lvl="0" indent="0" algn="ctr" defTabSz="1466850">
+          <a:pPr marL="0" lvl="0" indent="0" algn="l" defTabSz="1200150">
             <a:lnSpc>
               <a:spcPct val="90000"/>
             </a:lnSpc>
@@ -4449,10 +4662,50 @@
             <a:buNone/>
           </a:pPr>
           <a:r>
-            <a:rPr lang="es-EC" sz="3300" kern="1200"/>
-            <a:t>Random Forest</a:t>
+            <a:rPr lang="en-US" sz="2700" kern="1200" dirty="0"/>
+            <a:t>Ensemble Algorithms</a:t>
           </a:r>
-          <a:endParaRPr lang="en-US" sz="3300" kern="1200"/>
+        </a:p>
+        <a:p>
+          <a:pPr marL="228600" lvl="1" indent="-228600" algn="l" defTabSz="933450">
+            <a:lnSpc>
+              <a:spcPct val="90000"/>
+            </a:lnSpc>
+            <a:spcBef>
+              <a:spcPct val="0"/>
+            </a:spcBef>
+            <a:spcAft>
+              <a:spcPct val="15000"/>
+            </a:spcAft>
+            <a:buChar char="•"/>
+          </a:pPr>
+          <a:r>
+            <a:rPr lang="es-EC" sz="2100" kern="1200" dirty="0" err="1"/>
+            <a:t>Random</a:t>
+          </a:r>
+          <a:r>
+            <a:rPr lang="es-EC" sz="2100" kern="1200" dirty="0"/>
+            <a:t> Forest</a:t>
+          </a:r>
+          <a:endParaRPr lang="en-US" sz="2100" kern="1200" dirty="0"/>
+        </a:p>
+        <a:p>
+          <a:pPr marL="228600" lvl="1" indent="-228600" algn="l" defTabSz="933450">
+            <a:lnSpc>
+              <a:spcPct val="90000"/>
+            </a:lnSpc>
+            <a:spcBef>
+              <a:spcPct val="0"/>
+            </a:spcBef>
+            <a:spcAft>
+              <a:spcPct val="15000"/>
+            </a:spcAft>
+            <a:buChar char="•"/>
+          </a:pPr>
+          <a:r>
+            <a:rPr lang="en-US" sz="2100" kern="1200" dirty="0"/>
+            <a:t>Gradient Boost</a:t>
+          </a:r>
         </a:p>
       </dsp:txBody>
       <dsp:txXfrm>
@@ -4479,8 +4732,8 @@
       </dsp:nvSpPr>
       <dsp:spPr>
         <a:xfrm>
-          <a:off x="0" y="84899"/>
-          <a:ext cx="6492875" cy="575639"/>
+          <a:off x="0" y="110606"/>
+          <a:ext cx="6492875" cy="455715"/>
         </a:xfrm>
         <a:prstGeom prst="roundRect">
           <a:avLst/>
@@ -4522,12 +4775,12 @@
         </a:fontRef>
       </dsp:style>
       <dsp:txBody>
-        <a:bodyPr spcFirstLastPara="0" vert="horz" wrap="square" lIns="91440" tIns="91440" rIns="91440" bIns="91440" numCol="1" spcCol="1270" anchor="ctr" anchorCtr="0">
+        <a:bodyPr spcFirstLastPara="0" vert="horz" wrap="square" lIns="72390" tIns="72390" rIns="72390" bIns="72390" numCol="1" spcCol="1270" anchor="ctr" anchorCtr="0">
           <a:noAutofit/>
         </a:bodyPr>
         <a:lstStyle/>
         <a:p>
-          <a:pPr marL="0" lvl="0" indent="0" algn="l" defTabSz="1066800">
+          <a:pPr marL="0" lvl="0" indent="0" algn="l" defTabSz="844550">
             <a:lnSpc>
               <a:spcPct val="90000"/>
             </a:lnSpc>
@@ -4540,15 +4793,15 @@
             <a:buNone/>
           </a:pPr>
           <a:r>
-            <a:rPr lang="es-EC" sz="2400" kern="1200"/>
+            <a:rPr lang="es-EC" sz="1900" kern="1200"/>
             <a:t>Logistic Regression</a:t>
           </a:r>
-          <a:endParaRPr lang="en-US" sz="2400" kern="1200"/>
+          <a:endParaRPr lang="en-US" sz="1900" kern="1200"/>
         </a:p>
       </dsp:txBody>
       <dsp:txXfrm>
-        <a:off x="28100" y="112999"/>
-        <a:ext cx="6436675" cy="519439"/>
+        <a:off x="22246" y="132852"/>
+        <a:ext cx="6448383" cy="411223"/>
       </dsp:txXfrm>
     </dsp:sp>
     <dsp:sp modelId="{C4DFD3C5-312A-4589-8285-412C86C73C6E}">
@@ -4558,8 +4811,8 @@
       </dsp:nvSpPr>
       <dsp:spPr>
         <a:xfrm>
-          <a:off x="0" y="660539"/>
-          <a:ext cx="6492875" cy="658260"/>
+          <a:off x="0" y="566321"/>
+          <a:ext cx="6492875" cy="521122"/>
         </a:xfrm>
         <a:prstGeom prst="rect">
           <a:avLst/>
@@ -4583,12 +4836,12 @@
         <a:fontRef idx="minor"/>
       </dsp:style>
       <dsp:txBody>
-        <a:bodyPr spcFirstLastPara="0" vert="horz" wrap="square" lIns="206149" tIns="30480" rIns="170688" bIns="30480" numCol="1" spcCol="1270" anchor="t" anchorCtr="0">
+        <a:bodyPr spcFirstLastPara="0" vert="horz" wrap="square" lIns="206149" tIns="24130" rIns="135128" bIns="24130" numCol="1" spcCol="1270" anchor="t" anchorCtr="0">
           <a:noAutofit/>
         </a:bodyPr>
         <a:lstStyle/>
         <a:p>
-          <a:pPr marL="171450" lvl="1" indent="-171450" algn="l" defTabSz="844550">
+          <a:pPr marL="114300" lvl="1" indent="-114300" algn="l" defTabSz="666750">
             <a:lnSpc>
               <a:spcPct val="90000"/>
             </a:lnSpc>
@@ -4601,17 +4854,17 @@
             <a:buChar char="•"/>
           </a:pPr>
           <a:r>
-            <a:rPr lang="es-EC" sz="1900" kern="1200"/>
+            <a:rPr lang="es-EC" sz="1500" kern="1200"/>
             <a:t>Training: </a:t>
           </a:r>
           <a:r>
-            <a:rPr lang="es-ES" sz="1900" kern="1200"/>
+            <a:rPr lang="es-ES" sz="1500" kern="1200"/>
             <a:t>0.783333333333333</a:t>
           </a:r>
-          <a:endParaRPr lang="en-US" sz="1900" kern="1200"/>
+          <a:endParaRPr lang="en-US" sz="1500" kern="1200"/>
         </a:p>
         <a:p>
-          <a:pPr marL="171450" lvl="1" indent="-171450" algn="l" defTabSz="844550">
+          <a:pPr marL="114300" lvl="1" indent="-114300" algn="l" defTabSz="666750">
             <a:lnSpc>
               <a:spcPct val="90000"/>
             </a:lnSpc>
@@ -4624,19 +4877,19 @@
             <a:buChar char="•"/>
           </a:pPr>
           <a:r>
-            <a:rPr lang="es-EC" sz="1900" kern="1200"/>
+            <a:rPr lang="es-EC" sz="1500" kern="1200"/>
             <a:t>T</a:t>
           </a:r>
           <a:r>
-            <a:rPr lang="es-ES" sz="1900" kern="1200"/>
+            <a:rPr lang="es-ES" sz="1500" kern="1200"/>
             <a:t>est: 0.783333333333333</a:t>
           </a:r>
-          <a:endParaRPr lang="en-US" sz="1900" kern="1200"/>
+          <a:endParaRPr lang="en-US" sz="1500" kern="1200"/>
         </a:p>
       </dsp:txBody>
       <dsp:txXfrm>
-        <a:off x="0" y="660539"/>
-        <a:ext cx="6492875" cy="658260"/>
+        <a:off x="0" y="566321"/>
+        <a:ext cx="6492875" cy="521122"/>
       </dsp:txXfrm>
     </dsp:sp>
     <dsp:sp modelId="{A50FE496-705D-409F-A541-F4602DAF4AF1}">
@@ -4646,17 +4899,17 @@
       </dsp:nvSpPr>
       <dsp:spPr>
         <a:xfrm>
-          <a:off x="0" y="1318799"/>
-          <a:ext cx="6492875" cy="575639"/>
+          <a:off x="0" y="1087443"/>
+          <a:ext cx="6492875" cy="455715"/>
         </a:xfrm>
         <a:prstGeom prst="roundRect">
           <a:avLst/>
         </a:prstGeom>
         <a:solidFill>
           <a:schemeClr val="accent5">
-            <a:hueOff val="-2252848"/>
-            <a:satOff val="-5806"/>
-            <a:lumOff val="-3922"/>
+            <a:hueOff val="-1689636"/>
+            <a:satOff val="-4355"/>
+            <a:lumOff val="-2941"/>
             <a:alphaOff val="0"/>
           </a:schemeClr>
         </a:solidFill>
@@ -4689,12 +4942,12 @@
         </a:fontRef>
       </dsp:style>
       <dsp:txBody>
-        <a:bodyPr spcFirstLastPara="0" vert="horz" wrap="square" lIns="91440" tIns="91440" rIns="91440" bIns="91440" numCol="1" spcCol="1270" anchor="ctr" anchorCtr="0">
+        <a:bodyPr spcFirstLastPara="0" vert="horz" wrap="square" lIns="72390" tIns="72390" rIns="72390" bIns="72390" numCol="1" spcCol="1270" anchor="ctr" anchorCtr="0">
           <a:noAutofit/>
         </a:bodyPr>
         <a:lstStyle/>
         <a:p>
-          <a:pPr marL="0" lvl="0" indent="0" algn="l" defTabSz="1066800">
+          <a:pPr marL="0" lvl="0" indent="0" algn="l" defTabSz="844550">
             <a:lnSpc>
               <a:spcPct val="90000"/>
             </a:lnSpc>
@@ -4707,15 +4960,15 @@
             <a:buNone/>
           </a:pPr>
           <a:r>
-            <a:rPr lang="es-EC" sz="2400" kern="1200"/>
+            <a:rPr lang="es-EC" sz="1900" kern="1200"/>
             <a:t>Linear Regression</a:t>
           </a:r>
-          <a:endParaRPr lang="en-US" sz="2400" kern="1200"/>
+          <a:endParaRPr lang="en-US" sz="1900" kern="1200"/>
         </a:p>
       </dsp:txBody>
       <dsp:txXfrm>
-        <a:off x="28100" y="1346899"/>
-        <a:ext cx="6436675" cy="519439"/>
+        <a:off x="22246" y="1109689"/>
+        <a:ext cx="6448383" cy="411223"/>
       </dsp:txXfrm>
     </dsp:sp>
     <dsp:sp modelId="{C0192D08-C55A-43A7-A4CF-9C7AD8427FF2}">
@@ -4725,8 +4978,8 @@
       </dsp:nvSpPr>
       <dsp:spPr>
         <a:xfrm>
-          <a:off x="0" y="1894439"/>
-          <a:ext cx="6492875" cy="658260"/>
+          <a:off x="0" y="1543158"/>
+          <a:ext cx="6492875" cy="521122"/>
         </a:xfrm>
         <a:prstGeom prst="rect">
           <a:avLst/>
@@ -4750,12 +5003,12 @@
         <a:fontRef idx="minor"/>
       </dsp:style>
       <dsp:txBody>
-        <a:bodyPr spcFirstLastPara="0" vert="horz" wrap="square" lIns="206149" tIns="30480" rIns="170688" bIns="30480" numCol="1" spcCol="1270" anchor="t" anchorCtr="0">
+        <a:bodyPr spcFirstLastPara="0" vert="horz" wrap="square" lIns="206149" tIns="24130" rIns="135128" bIns="24130" numCol="1" spcCol="1270" anchor="t" anchorCtr="0">
           <a:noAutofit/>
         </a:bodyPr>
         <a:lstStyle/>
         <a:p>
-          <a:pPr marL="171450" lvl="1" indent="-171450" algn="l" defTabSz="844550">
+          <a:pPr marL="114300" lvl="1" indent="-114300" algn="l" defTabSz="666750">
             <a:lnSpc>
               <a:spcPct val="90000"/>
             </a:lnSpc>
@@ -4768,17 +5021,17 @@
             <a:buChar char="•"/>
           </a:pPr>
           <a:r>
-            <a:rPr lang="es-EC" sz="1900" kern="1200"/>
+            <a:rPr lang="es-EC" sz="1500" kern="1200"/>
             <a:t>Training: </a:t>
           </a:r>
           <a:r>
-            <a:rPr lang="es-ES" sz="1900" kern="1200"/>
+            <a:rPr lang="es-ES" sz="1500" kern="1200"/>
             <a:t>0.757142857142857</a:t>
           </a:r>
-          <a:endParaRPr lang="en-US" sz="1900" kern="1200"/>
+          <a:endParaRPr lang="en-US" sz="1500" kern="1200"/>
         </a:p>
         <a:p>
-          <a:pPr marL="171450" lvl="1" indent="-171450" algn="l" defTabSz="844550">
+          <a:pPr marL="114300" lvl="1" indent="-114300" algn="l" defTabSz="666750">
             <a:lnSpc>
               <a:spcPct val="90000"/>
             </a:lnSpc>
@@ -4791,19 +5044,19 @@
             <a:buChar char="•"/>
           </a:pPr>
           <a:r>
-            <a:rPr lang="es-EC" sz="1900" kern="1200"/>
+            <a:rPr lang="es-EC" sz="1500" kern="1200"/>
             <a:t>T</a:t>
           </a:r>
           <a:r>
-            <a:rPr lang="es-ES" sz="1900" kern="1200"/>
+            <a:rPr lang="es-ES" sz="1500" kern="1200"/>
             <a:t>est:0.766666666666667</a:t>
           </a:r>
-          <a:endParaRPr lang="en-US" sz="1900" kern="1200"/>
+          <a:endParaRPr lang="en-US" sz="1500" kern="1200"/>
         </a:p>
       </dsp:txBody>
       <dsp:txXfrm>
-        <a:off x="0" y="1894439"/>
-        <a:ext cx="6492875" cy="658260"/>
+        <a:off x="0" y="1543158"/>
+        <a:ext cx="6492875" cy="521122"/>
       </dsp:txXfrm>
     </dsp:sp>
     <dsp:sp modelId="{1CFB7155-92CA-4B0D-8CB1-5FE74A6FD99A}">
@@ -4813,17 +5066,17 @@
       </dsp:nvSpPr>
       <dsp:spPr>
         <a:xfrm>
-          <a:off x="0" y="2552700"/>
-          <a:ext cx="6492875" cy="575639"/>
+          <a:off x="0" y="2064281"/>
+          <a:ext cx="6492875" cy="455715"/>
         </a:xfrm>
         <a:prstGeom prst="roundRect">
           <a:avLst/>
         </a:prstGeom>
         <a:solidFill>
           <a:schemeClr val="accent5">
-            <a:hueOff val="-4505695"/>
-            <a:satOff val="-11613"/>
-            <a:lumOff val="-7843"/>
+            <a:hueOff val="-3379271"/>
+            <a:satOff val="-8710"/>
+            <a:lumOff val="-5883"/>
             <a:alphaOff val="0"/>
           </a:schemeClr>
         </a:solidFill>
@@ -4856,12 +5109,12 @@
         </a:fontRef>
       </dsp:style>
       <dsp:txBody>
-        <a:bodyPr spcFirstLastPara="0" vert="horz" wrap="square" lIns="91440" tIns="91440" rIns="91440" bIns="91440" numCol="1" spcCol="1270" anchor="ctr" anchorCtr="0">
+        <a:bodyPr spcFirstLastPara="0" vert="horz" wrap="square" lIns="72390" tIns="72390" rIns="72390" bIns="72390" numCol="1" spcCol="1270" anchor="ctr" anchorCtr="0">
           <a:noAutofit/>
         </a:bodyPr>
         <a:lstStyle/>
         <a:p>
-          <a:pPr marL="0" lvl="0" indent="0" algn="l" defTabSz="1066800">
+          <a:pPr marL="0" lvl="0" indent="0" algn="l" defTabSz="844550">
             <a:lnSpc>
               <a:spcPct val="90000"/>
             </a:lnSpc>
@@ -4874,19 +5127,19 @@
             <a:buNone/>
           </a:pPr>
           <a:r>
-            <a:rPr lang="es-EC" sz="2400" kern="1200"/>
+            <a:rPr lang="es-EC" sz="1900" kern="1200"/>
             <a:t>R</a:t>
           </a:r>
           <a:r>
-            <a:rPr lang="es-ES" sz="2400" kern="1200"/>
+            <a:rPr lang="es-ES" sz="1900" kern="1200"/>
             <a:t>idge Regression</a:t>
           </a:r>
-          <a:endParaRPr lang="en-US" sz="2400" kern="1200"/>
+          <a:endParaRPr lang="en-US" sz="1900" kern="1200"/>
         </a:p>
       </dsp:txBody>
       <dsp:txXfrm>
-        <a:off x="28100" y="2580800"/>
-        <a:ext cx="6436675" cy="519439"/>
+        <a:off x="22246" y="2086527"/>
+        <a:ext cx="6448383" cy="411223"/>
       </dsp:txXfrm>
     </dsp:sp>
     <dsp:sp modelId="{40C9563D-5013-4EA5-B7DE-60878DCC8052}">
@@ -4896,8 +5149,8 @@
       </dsp:nvSpPr>
       <dsp:spPr>
         <a:xfrm>
-          <a:off x="0" y="3128339"/>
-          <a:ext cx="6492875" cy="658260"/>
+          <a:off x="0" y="2519996"/>
+          <a:ext cx="6492875" cy="521122"/>
         </a:xfrm>
         <a:prstGeom prst="rect">
           <a:avLst/>
@@ -4921,12 +5174,12 @@
         <a:fontRef idx="minor"/>
       </dsp:style>
       <dsp:txBody>
-        <a:bodyPr spcFirstLastPara="0" vert="horz" wrap="square" lIns="206149" tIns="30480" rIns="170688" bIns="30480" numCol="1" spcCol="1270" anchor="t" anchorCtr="0">
+        <a:bodyPr spcFirstLastPara="0" vert="horz" wrap="square" lIns="206149" tIns="24130" rIns="135128" bIns="24130" numCol="1" spcCol="1270" anchor="t" anchorCtr="0">
           <a:noAutofit/>
         </a:bodyPr>
         <a:lstStyle/>
         <a:p>
-          <a:pPr marL="171450" lvl="1" indent="-171450" algn="l" defTabSz="844550">
+          <a:pPr marL="114300" lvl="1" indent="-114300" algn="l" defTabSz="666750">
             <a:lnSpc>
               <a:spcPct val="90000"/>
             </a:lnSpc>
@@ -4939,17 +5192,17 @@
             <a:buChar char="•"/>
           </a:pPr>
           <a:r>
-            <a:rPr lang="es-EC" sz="1900" kern="1200"/>
+            <a:rPr lang="es-EC" sz="1500" kern="1200"/>
             <a:t>T</a:t>
           </a:r>
           <a:r>
-            <a:rPr lang="es-ES" sz="1900" kern="1200"/>
+            <a:rPr lang="es-ES" sz="1500" kern="1200"/>
             <a:t>raining: 0.792857142857143</a:t>
           </a:r>
-          <a:endParaRPr lang="en-US" sz="1900" kern="1200"/>
+          <a:endParaRPr lang="en-US" sz="1500" kern="1200"/>
         </a:p>
         <a:p>
-          <a:pPr marL="171450" lvl="1" indent="-171450" algn="l" defTabSz="844550">
+          <a:pPr marL="114300" lvl="1" indent="-114300" algn="l" defTabSz="666750">
             <a:lnSpc>
               <a:spcPct val="90000"/>
             </a:lnSpc>
@@ -4962,19 +5215,19 @@
             <a:buChar char="•"/>
           </a:pPr>
           <a:r>
-            <a:rPr lang="es-EC" sz="1900" kern="1200"/>
+            <a:rPr lang="es-EC" sz="1500" kern="1200"/>
             <a:t>T</a:t>
           </a:r>
           <a:r>
-            <a:rPr lang="es-ES" sz="1900" kern="1200"/>
+            <a:rPr lang="es-ES" sz="1500" kern="1200"/>
             <a:t>est: 0.805555555555556</a:t>
           </a:r>
-          <a:endParaRPr lang="en-US" sz="1900" kern="1200"/>
+          <a:endParaRPr lang="en-US" sz="1500" kern="1200"/>
         </a:p>
       </dsp:txBody>
       <dsp:txXfrm>
-        <a:off x="0" y="3128339"/>
-        <a:ext cx="6492875" cy="658260"/>
+        <a:off x="0" y="2519996"/>
+        <a:ext cx="6492875" cy="521122"/>
       </dsp:txXfrm>
     </dsp:sp>
     <dsp:sp modelId="{7F9190FB-913C-48EE-B8A8-0551C69AA14A}">
@@ -4984,8 +5237,175 @@
       </dsp:nvSpPr>
       <dsp:spPr>
         <a:xfrm>
-          <a:off x="0" y="3786600"/>
-          <a:ext cx="6492875" cy="575639"/>
+          <a:off x="0" y="3041118"/>
+          <a:ext cx="6492875" cy="455715"/>
+        </a:xfrm>
+        <a:prstGeom prst="roundRect">
+          <a:avLst/>
+        </a:prstGeom>
+        <a:solidFill>
+          <a:schemeClr val="accent5">
+            <a:hueOff val="-5068907"/>
+            <a:satOff val="-13064"/>
+            <a:lumOff val="-8824"/>
+            <a:alphaOff val="0"/>
+          </a:schemeClr>
+        </a:solidFill>
+        <a:ln w="19050" cap="flat" cmpd="sng" algn="ctr">
+          <a:solidFill>
+            <a:schemeClr val="lt1">
+              <a:hueOff val="0"/>
+              <a:satOff val="0"/>
+              <a:lumOff val="0"/>
+              <a:alphaOff val="0"/>
+            </a:schemeClr>
+          </a:solidFill>
+          <a:prstDash val="solid"/>
+          <a:miter lim="800000"/>
+        </a:ln>
+        <a:effectLst/>
+      </dsp:spPr>
+      <dsp:style>
+        <a:lnRef idx="3">
+          <a:scrgbClr r="0" g="0" b="0"/>
+        </a:lnRef>
+        <a:fillRef idx="1">
+          <a:scrgbClr r="0" g="0" b="0"/>
+        </a:fillRef>
+        <a:effectRef idx="1">
+          <a:scrgbClr r="0" g="0" b="0"/>
+        </a:effectRef>
+        <a:fontRef idx="minor">
+          <a:schemeClr val="lt1"/>
+        </a:fontRef>
+      </dsp:style>
+      <dsp:txBody>
+        <a:bodyPr spcFirstLastPara="0" vert="horz" wrap="square" lIns="72390" tIns="72390" rIns="72390" bIns="72390" numCol="1" spcCol="1270" anchor="ctr" anchorCtr="0">
+          <a:noAutofit/>
+        </a:bodyPr>
+        <a:lstStyle/>
+        <a:p>
+          <a:pPr marL="0" lvl="0" indent="0" algn="l" defTabSz="844550">
+            <a:lnSpc>
+              <a:spcPct val="90000"/>
+            </a:lnSpc>
+            <a:spcBef>
+              <a:spcPct val="0"/>
+            </a:spcBef>
+            <a:spcAft>
+              <a:spcPct val="35000"/>
+            </a:spcAft>
+            <a:buNone/>
+          </a:pPr>
+          <a:r>
+            <a:rPr lang="es-EC" sz="1900" kern="1200"/>
+            <a:t>Random Forest</a:t>
+          </a:r>
+          <a:endParaRPr lang="en-US" sz="1900" kern="1200"/>
+        </a:p>
+      </dsp:txBody>
+      <dsp:txXfrm>
+        <a:off x="22246" y="3063364"/>
+        <a:ext cx="6448383" cy="411223"/>
+      </dsp:txXfrm>
+    </dsp:sp>
+    <dsp:sp modelId="{D65FADB4-159F-4229-AAF8-33026A54354A}">
+      <dsp:nvSpPr>
+        <dsp:cNvPr id="0" name=""/>
+        <dsp:cNvSpPr/>
+      </dsp:nvSpPr>
+      <dsp:spPr>
+        <a:xfrm>
+          <a:off x="0" y="3496833"/>
+          <a:ext cx="6492875" cy="521122"/>
+        </a:xfrm>
+        <a:prstGeom prst="rect">
+          <a:avLst/>
+        </a:prstGeom>
+        <a:noFill/>
+        <a:ln>
+          <a:noFill/>
+        </a:ln>
+        <a:effectLst/>
+      </dsp:spPr>
+      <dsp:style>
+        <a:lnRef idx="0">
+          <a:scrgbClr r="0" g="0" b="0"/>
+        </a:lnRef>
+        <a:fillRef idx="0">
+          <a:scrgbClr r="0" g="0" b="0"/>
+        </a:fillRef>
+        <a:effectRef idx="0">
+          <a:scrgbClr r="0" g="0" b="0"/>
+        </a:effectRef>
+        <a:fontRef idx="minor"/>
+      </dsp:style>
+      <dsp:txBody>
+        <a:bodyPr spcFirstLastPara="0" vert="horz" wrap="square" lIns="206149" tIns="24130" rIns="135128" bIns="24130" numCol="1" spcCol="1270" anchor="t" anchorCtr="0">
+          <a:noAutofit/>
+        </a:bodyPr>
+        <a:lstStyle/>
+        <a:p>
+          <a:pPr marL="114300" lvl="1" indent="-114300" algn="l" defTabSz="666750">
+            <a:lnSpc>
+              <a:spcPct val="90000"/>
+            </a:lnSpc>
+            <a:spcBef>
+              <a:spcPct val="0"/>
+            </a:spcBef>
+            <a:spcAft>
+              <a:spcPct val="20000"/>
+            </a:spcAft>
+            <a:buChar char="•"/>
+          </a:pPr>
+          <a:r>
+            <a:rPr lang="es-EC" sz="1500" kern="1200"/>
+            <a:t>Training: </a:t>
+          </a:r>
+          <a:r>
+            <a:rPr lang="es-ES" sz="1500" kern="1200"/>
+            <a:t>0.857142857142857</a:t>
+          </a:r>
+          <a:endParaRPr lang="en-US" sz="1500" kern="1200"/>
+        </a:p>
+        <a:p>
+          <a:pPr marL="114300" lvl="1" indent="-114300" algn="l" defTabSz="666750">
+            <a:lnSpc>
+              <a:spcPct val="90000"/>
+            </a:lnSpc>
+            <a:spcBef>
+              <a:spcPct val="0"/>
+            </a:spcBef>
+            <a:spcAft>
+              <a:spcPct val="20000"/>
+            </a:spcAft>
+            <a:buChar char="•"/>
+          </a:pPr>
+          <a:r>
+            <a:rPr lang="es-EC" sz="1500" kern="1200" dirty="0"/>
+            <a:t>Test: </a:t>
+          </a:r>
+          <a:r>
+            <a:rPr lang="es-ES" sz="1500" kern="1200" dirty="0"/>
+            <a:t>0.8</a:t>
+          </a:r>
+          <a:endParaRPr lang="en-US" sz="1500" kern="1200" dirty="0"/>
+        </a:p>
+      </dsp:txBody>
+      <dsp:txXfrm>
+        <a:off x="0" y="3496833"/>
+        <a:ext cx="6492875" cy="521122"/>
+      </dsp:txXfrm>
+    </dsp:sp>
+    <dsp:sp modelId="{302FA4A1-2B1C-4A58-9189-CFB117B85584}">
+      <dsp:nvSpPr>
+        <dsp:cNvPr id="0" name=""/>
+        <dsp:cNvSpPr/>
+      </dsp:nvSpPr>
+      <dsp:spPr>
+        <a:xfrm>
+          <a:off x="0" y="4017956"/>
+          <a:ext cx="6492875" cy="455715"/>
         </a:xfrm>
         <a:prstGeom prst="roundRect">
           <a:avLst/>
@@ -5027,12 +5447,12 @@
         </a:fontRef>
       </dsp:style>
       <dsp:txBody>
-        <a:bodyPr spcFirstLastPara="0" vert="horz" wrap="square" lIns="91440" tIns="91440" rIns="91440" bIns="91440" numCol="1" spcCol="1270" anchor="ctr" anchorCtr="0">
+        <a:bodyPr spcFirstLastPara="0" vert="horz" wrap="square" lIns="72390" tIns="72390" rIns="72390" bIns="72390" numCol="1" spcCol="1270" anchor="ctr" anchorCtr="0">
           <a:noAutofit/>
         </a:bodyPr>
         <a:lstStyle/>
         <a:p>
-          <a:pPr marL="0" lvl="0" indent="0" algn="l" defTabSz="1066800">
+          <a:pPr marL="0" lvl="0" indent="0" algn="l" defTabSz="844550">
             <a:lnSpc>
               <a:spcPct val="90000"/>
             </a:lnSpc>
@@ -5045,26 +5465,25 @@
             <a:buNone/>
           </a:pPr>
           <a:r>
-            <a:rPr lang="es-EC" sz="2400" kern="1200"/>
-            <a:t>Random Forest</a:t>
+            <a:rPr lang="en-US" sz="1900" kern="1200" dirty="0"/>
+            <a:t>Gradient Boost</a:t>
           </a:r>
-          <a:endParaRPr lang="en-US" sz="2400" kern="1200"/>
         </a:p>
       </dsp:txBody>
       <dsp:txXfrm>
-        <a:off x="28100" y="3814700"/>
-        <a:ext cx="6436675" cy="519439"/>
+        <a:off x="22246" y="4040202"/>
+        <a:ext cx="6448383" cy="411223"/>
       </dsp:txXfrm>
     </dsp:sp>
-    <dsp:sp modelId="{D65FADB4-159F-4229-AAF8-33026A54354A}">
+    <dsp:sp modelId="{2CB7EDD1-635D-42FE-8184-6DDB9775137A}">
       <dsp:nvSpPr>
         <dsp:cNvPr id="0" name=""/>
         <dsp:cNvSpPr/>
       </dsp:nvSpPr>
       <dsp:spPr>
         <a:xfrm>
-          <a:off x="0" y="4362240"/>
-          <a:ext cx="6492875" cy="658260"/>
+          <a:off x="0" y="4473671"/>
+          <a:ext cx="6492875" cy="521122"/>
         </a:xfrm>
         <a:prstGeom prst="rect">
           <a:avLst/>
@@ -5088,12 +5507,12 @@
         <a:fontRef idx="minor"/>
       </dsp:style>
       <dsp:txBody>
-        <a:bodyPr spcFirstLastPara="0" vert="horz" wrap="square" lIns="206149" tIns="30480" rIns="170688" bIns="30480" numCol="1" spcCol="1270" anchor="t" anchorCtr="0">
+        <a:bodyPr spcFirstLastPara="0" vert="horz" wrap="square" lIns="206149" tIns="24130" rIns="135128" bIns="24130" numCol="1" spcCol="1270" anchor="t" anchorCtr="0">
           <a:noAutofit/>
         </a:bodyPr>
         <a:lstStyle/>
         <a:p>
-          <a:pPr marL="171450" lvl="1" indent="-171450" algn="l" defTabSz="844550">
+          <a:pPr marL="114300" lvl="1" indent="-114300" algn="l" defTabSz="666750">
             <a:lnSpc>
               <a:spcPct val="90000"/>
             </a:lnSpc>
@@ -5106,17 +5525,19 @@
             <a:buChar char="•"/>
           </a:pPr>
           <a:r>
-            <a:rPr lang="es-EC" sz="1900" kern="1200"/>
+            <a:rPr lang="en-US" sz="1500" kern="1200" dirty="0"/>
             <a:t>Training: </a:t>
           </a:r>
           <a:r>
-            <a:rPr lang="es-ES" sz="1900" kern="1200"/>
-            <a:t>0.857142857142857</a:t>
+            <a:rPr lang="es-EC" sz="1500" kern="1200" dirty="0">
+              <a:effectLst/>
+            </a:rPr>
+            <a:t>0.823809523809524</a:t>
           </a:r>
-          <a:endParaRPr lang="en-US" sz="1900" kern="1200"/>
+          <a:endParaRPr lang="en-US" sz="1500" kern="1200" dirty="0"/>
         </a:p>
         <a:p>
-          <a:pPr marL="171450" lvl="1" indent="-171450" algn="l" defTabSz="844550">
+          <a:pPr marL="114300" lvl="1" indent="-114300" algn="l" defTabSz="666750">
             <a:lnSpc>
               <a:spcPct val="90000"/>
             </a:lnSpc>
@@ -5129,19 +5550,21 @@
             <a:buChar char="•"/>
           </a:pPr>
           <a:r>
-            <a:rPr lang="es-EC" sz="1900" kern="1200"/>
+            <a:rPr lang="en-US" sz="1500" kern="1200" dirty="0"/>
             <a:t>Test: </a:t>
           </a:r>
           <a:r>
-            <a:rPr lang="es-ES" sz="1900" kern="1200"/>
-            <a:t>0.8</a:t>
+            <a:rPr lang="es-EC" sz="1500" kern="1200" dirty="0">
+              <a:effectLst/>
+            </a:rPr>
+            <a:t>0.783333333333333</a:t>
           </a:r>
-          <a:endParaRPr lang="en-US" sz="1900" kern="1200"/>
+          <a:endParaRPr lang="en-US" sz="1500" kern="1200" dirty="0"/>
         </a:p>
       </dsp:txBody>
       <dsp:txXfrm>
-        <a:off x="0" y="4362240"/>
-        <a:ext cx="6492875" cy="658260"/>
+        <a:off x="0" y="4473671"/>
+        <a:ext cx="6492875" cy="521122"/>
       </dsp:txXfrm>
     </dsp:sp>
   </dsp:spTree>
@@ -9343,7 +9766,7 @@
           <a:p>
             <a:fld id="{FBECE9C9-D874-4E87-A9C2-613A89DA3774}" type="datetimeFigureOut">
               <a:rPr lang="es-ES" smtClean="0"/>
-              <a:t>25/01/2019</a:t>
+              <a:t>07/02/2019</a:t>
             </a:fld>
             <a:endParaRPr lang="es-ES"/>
           </a:p>
@@ -9397,7 +9820,7 @@
           <a:p>
             <a:fld id="{8967A806-F23D-45A9-9035-27B86F863D70}" type="slidenum">
               <a:rPr lang="es-ES" smtClean="0"/>
-              <a:t>‹Nº›</a:t>
+              <a:t>‹#›</a:t>
             </a:fld>
             <a:endParaRPr lang="es-ES"/>
           </a:p>
@@ -9541,7 +9964,7 @@
           <a:p>
             <a:fld id="{FBECE9C9-D874-4E87-A9C2-613A89DA3774}" type="datetimeFigureOut">
               <a:rPr lang="es-ES" smtClean="0"/>
-              <a:t>25/01/2019</a:t>
+              <a:t>07/02/2019</a:t>
             </a:fld>
             <a:endParaRPr lang="es-ES"/>
           </a:p>
@@ -9595,7 +10018,7 @@
           <a:p>
             <a:fld id="{8967A806-F23D-45A9-9035-27B86F863D70}" type="slidenum">
               <a:rPr lang="es-ES" smtClean="0"/>
-              <a:t>‹Nº›</a:t>
+              <a:t>‹#›</a:t>
             </a:fld>
             <a:endParaRPr lang="es-ES"/>
           </a:p>
@@ -9749,7 +10172,7 @@
           <a:p>
             <a:fld id="{FBECE9C9-D874-4E87-A9C2-613A89DA3774}" type="datetimeFigureOut">
               <a:rPr lang="es-ES" smtClean="0"/>
-              <a:t>25/01/2019</a:t>
+              <a:t>07/02/2019</a:t>
             </a:fld>
             <a:endParaRPr lang="es-ES"/>
           </a:p>
@@ -9803,7 +10226,7 @@
           <a:p>
             <a:fld id="{8967A806-F23D-45A9-9035-27B86F863D70}" type="slidenum">
               <a:rPr lang="es-ES" smtClean="0"/>
-              <a:t>‹Nº›</a:t>
+              <a:t>‹#›</a:t>
             </a:fld>
             <a:endParaRPr lang="es-ES"/>
           </a:p>
@@ -9947,7 +10370,7 @@
           <a:p>
             <a:fld id="{FBECE9C9-D874-4E87-A9C2-613A89DA3774}" type="datetimeFigureOut">
               <a:rPr lang="es-ES" smtClean="0"/>
-              <a:t>25/01/2019</a:t>
+              <a:t>07/02/2019</a:t>
             </a:fld>
             <a:endParaRPr lang="es-ES"/>
           </a:p>
@@ -10001,7 +10424,7 @@
           <a:p>
             <a:fld id="{8967A806-F23D-45A9-9035-27B86F863D70}" type="slidenum">
               <a:rPr lang="es-ES" smtClean="0"/>
-              <a:t>‹Nº›</a:t>
+              <a:t>‹#›</a:t>
             </a:fld>
             <a:endParaRPr lang="es-ES"/>
           </a:p>
@@ -10222,7 +10645,7 @@
           <a:p>
             <a:fld id="{FBECE9C9-D874-4E87-A9C2-613A89DA3774}" type="datetimeFigureOut">
               <a:rPr lang="es-ES" smtClean="0"/>
-              <a:t>25/01/2019</a:t>
+              <a:t>07/02/2019</a:t>
             </a:fld>
             <a:endParaRPr lang="es-ES"/>
           </a:p>
@@ -10276,7 +10699,7 @@
           <a:p>
             <a:fld id="{8967A806-F23D-45A9-9035-27B86F863D70}" type="slidenum">
               <a:rPr lang="es-ES" smtClean="0"/>
-              <a:t>‹Nº›</a:t>
+              <a:t>‹#›</a:t>
             </a:fld>
             <a:endParaRPr lang="es-ES"/>
           </a:p>
@@ -10487,7 +10910,7 @@
           <a:p>
             <a:fld id="{FBECE9C9-D874-4E87-A9C2-613A89DA3774}" type="datetimeFigureOut">
               <a:rPr lang="es-ES" smtClean="0"/>
-              <a:t>25/01/2019</a:t>
+              <a:t>07/02/2019</a:t>
             </a:fld>
             <a:endParaRPr lang="es-ES"/>
           </a:p>
@@ -10541,7 +10964,7 @@
           <a:p>
             <a:fld id="{8967A806-F23D-45A9-9035-27B86F863D70}" type="slidenum">
               <a:rPr lang="es-ES" smtClean="0"/>
-              <a:t>‹Nº›</a:t>
+              <a:t>‹#›</a:t>
             </a:fld>
             <a:endParaRPr lang="es-ES"/>
           </a:p>
@@ -10899,7 +11322,7 @@
           <a:p>
             <a:fld id="{FBECE9C9-D874-4E87-A9C2-613A89DA3774}" type="datetimeFigureOut">
               <a:rPr lang="es-ES" smtClean="0"/>
-              <a:t>25/01/2019</a:t>
+              <a:t>07/02/2019</a:t>
             </a:fld>
             <a:endParaRPr lang="es-ES"/>
           </a:p>
@@ -10953,7 +11376,7 @@
           <a:p>
             <a:fld id="{8967A806-F23D-45A9-9035-27B86F863D70}" type="slidenum">
               <a:rPr lang="es-ES" smtClean="0"/>
-              <a:t>‹Nº›</a:t>
+              <a:t>‹#›</a:t>
             </a:fld>
             <a:endParaRPr lang="es-ES"/>
           </a:p>
@@ -11040,7 +11463,7 @@
           <a:p>
             <a:fld id="{FBECE9C9-D874-4E87-A9C2-613A89DA3774}" type="datetimeFigureOut">
               <a:rPr lang="es-ES" smtClean="0"/>
-              <a:t>25/01/2019</a:t>
+              <a:t>07/02/2019</a:t>
             </a:fld>
             <a:endParaRPr lang="es-ES"/>
           </a:p>
@@ -11094,7 +11517,7 @@
           <a:p>
             <a:fld id="{8967A806-F23D-45A9-9035-27B86F863D70}" type="slidenum">
               <a:rPr lang="es-ES" smtClean="0"/>
-              <a:t>‹Nº›</a:t>
+              <a:t>‹#›</a:t>
             </a:fld>
             <a:endParaRPr lang="es-ES"/>
           </a:p>
@@ -11153,7 +11576,7 @@
           <a:p>
             <a:fld id="{FBECE9C9-D874-4E87-A9C2-613A89DA3774}" type="datetimeFigureOut">
               <a:rPr lang="es-ES" smtClean="0"/>
-              <a:t>25/01/2019</a:t>
+              <a:t>07/02/2019</a:t>
             </a:fld>
             <a:endParaRPr lang="es-ES"/>
           </a:p>
@@ -11207,7 +11630,7 @@
           <a:p>
             <a:fld id="{8967A806-F23D-45A9-9035-27B86F863D70}" type="slidenum">
               <a:rPr lang="es-ES" smtClean="0"/>
-              <a:t>‹Nº›</a:t>
+              <a:t>‹#›</a:t>
             </a:fld>
             <a:endParaRPr lang="es-ES"/>
           </a:p>
@@ -11464,7 +11887,7 @@
           <a:p>
             <a:fld id="{FBECE9C9-D874-4E87-A9C2-613A89DA3774}" type="datetimeFigureOut">
               <a:rPr lang="es-ES" smtClean="0"/>
-              <a:t>25/01/2019</a:t>
+              <a:t>07/02/2019</a:t>
             </a:fld>
             <a:endParaRPr lang="es-ES"/>
           </a:p>
@@ -11518,7 +11941,7 @@
           <a:p>
             <a:fld id="{8967A806-F23D-45A9-9035-27B86F863D70}" type="slidenum">
               <a:rPr lang="es-ES" smtClean="0"/>
-              <a:t>‹Nº›</a:t>
+              <a:t>‹#›</a:t>
             </a:fld>
             <a:endParaRPr lang="es-ES"/>
           </a:p>
@@ -11752,7 +12175,7 @@
           <a:p>
             <a:fld id="{FBECE9C9-D874-4E87-A9C2-613A89DA3774}" type="datetimeFigureOut">
               <a:rPr lang="es-ES" smtClean="0"/>
-              <a:t>25/01/2019</a:t>
+              <a:t>07/02/2019</a:t>
             </a:fld>
             <a:endParaRPr lang="es-ES"/>
           </a:p>
@@ -11806,7 +12229,7 @@
           <a:p>
             <a:fld id="{8967A806-F23D-45A9-9035-27B86F863D70}" type="slidenum">
               <a:rPr lang="es-ES" smtClean="0"/>
-              <a:t>‹Nº›</a:t>
+              <a:t>‹#›</a:t>
             </a:fld>
             <a:endParaRPr lang="es-ES"/>
           </a:p>
@@ -11993,7 +12416,7 @@
           <a:p>
             <a:fld id="{FBECE9C9-D874-4E87-A9C2-613A89DA3774}" type="datetimeFigureOut">
               <a:rPr lang="es-ES" smtClean="0"/>
-              <a:t>25/01/2019</a:t>
+              <a:t>07/02/2019</a:t>
             </a:fld>
             <a:endParaRPr lang="es-ES"/>
           </a:p>
@@ -12083,7 +12506,7 @@
           <a:p>
             <a:fld id="{8967A806-F23D-45A9-9035-27B86F863D70}" type="slidenum">
               <a:rPr lang="es-ES" smtClean="0"/>
-              <a:t>‹Nº›</a:t>
+              <a:t>‹#›</a:t>
             </a:fld>
             <a:endParaRPr lang="es-ES"/>
           </a:p>
@@ -13638,7 +14061,7 @@
             <p:ph idx="1"/>
             <p:extLst>
               <p:ext uri="{D42A27DB-BD31-4B8C-83A1-F6EECF244321}">
-                <p14:modId xmlns:p14="http://schemas.microsoft.com/office/powerpoint/2010/main" val="631110662"/>
+                <p14:modId xmlns:p14="http://schemas.microsoft.com/office/powerpoint/2010/main" val="327663263"/>
               </p:ext>
             </p:extLst>
           </p:nvPr>
@@ -14345,7 +14768,7 @@
             <p:ph idx="1"/>
             <p:extLst>
               <p:ext uri="{D42A27DB-BD31-4B8C-83A1-F6EECF244321}">
-                <p14:modId xmlns:p14="http://schemas.microsoft.com/office/powerpoint/2010/main" val="3601298510"/>
+                <p14:modId xmlns:p14="http://schemas.microsoft.com/office/powerpoint/2010/main" val="1007747252"/>
               </p:ext>
             </p:extLst>
           </p:nvPr>
@@ -14364,6 +14787,190 @@
     <p:extLst>
       <p:ext uri="{BB962C8B-B14F-4D97-AF65-F5344CB8AC3E}">
         <p14:creationId xmlns:p14="http://schemas.microsoft.com/office/powerpoint/2010/main" val="3150686332"/>
+      </p:ext>
+    </p:extLst>
+  </p:cSld>
+  <p:clrMapOvr>
+    <a:masterClrMapping/>
+  </p:clrMapOvr>
+</p:sld>
+</file>
+
+<file path=ppt/slides/slide13.xml><?xml version="1.0" encoding="utf-8"?>
+<p:sld xmlns:a="http://schemas.openxmlformats.org/drawingml/2006/main" xmlns:r="http://schemas.openxmlformats.org/officeDocument/2006/relationships" xmlns:p="http://schemas.openxmlformats.org/presentationml/2006/main">
+  <p:cSld>
+    <p:bg>
+      <p:bgPr>
+        <a:solidFill>
+          <a:schemeClr val="bg1"/>
+        </a:solidFill>
+        <a:effectLst/>
+      </p:bgPr>
+    </p:bg>
+    <p:spTree>
+      <p:nvGrpSpPr>
+        <p:cNvPr id="1" name=""/>
+        <p:cNvGrpSpPr/>
+        <p:nvPr/>
+      </p:nvGrpSpPr>
+      <p:grpSpPr>
+        <a:xfrm>
+          <a:off x="0" y="0"/>
+          <a:ext cx="0" cy="0"/>
+          <a:chOff x="0" y="0"/>
+          <a:chExt cx="0" cy="0"/>
+        </a:xfrm>
+      </p:grpSpPr>
+      <p:sp>
+        <p:nvSpPr>
+          <p:cNvPr id="87" name="Rectangle 86">
+            <a:extLst>
+              <a:ext uri="{FF2B5EF4-FFF2-40B4-BE49-F238E27FC236}">
+                <a16:creationId xmlns:a16="http://schemas.microsoft.com/office/drawing/2014/main" id="{1707FC24-6981-43D9-B525-C7832BA22463}"/>
+              </a:ext>
+              <a:ext uri="{C183D7F6-B498-43B3-948B-1728B52AA6E4}">
+                <adec:decorative xmlns:adec="http://schemas.microsoft.com/office/drawing/2017/decorative" val="1"/>
+              </a:ext>
+            </a:extLst>
+          </p:cNvPr>
+          <p:cNvSpPr>
+            <a:spLocks noGrp="1" noRot="1" noChangeAspect="1" noMove="1" noResize="1" noEditPoints="1" noAdjustHandles="1" noChangeArrowheads="1" noChangeShapeType="1" noTextEdit="1"/>
+          </p:cNvSpPr>
+          <p:nvPr>
+            <p:extLst>
+              <p:ext uri="{386F3935-93C4-4BCD-93E2-E3B085C9AB24}">
+                <p16:designElem xmlns:p16="http://schemas.microsoft.com/office/powerpoint/2015/main" val="1"/>
+              </p:ext>
+            </p:extLst>
+          </p:nvPr>
+        </p:nvSpPr>
+        <p:spPr bwMode="ltGray">
+          <a:xfrm>
+            <a:off x="336884" y="311449"/>
+            <a:ext cx="4332307" cy="6179552"/>
+          </a:xfrm>
+          <a:prstGeom prst="rect">
+            <a:avLst/>
+          </a:prstGeom>
+          <a:solidFill>
+            <a:srgbClr val="404040"/>
+          </a:solidFill>
+          <a:ln w="127000" cap="sq" cmpd="thinThick">
+            <a:solidFill>
+              <a:srgbClr val="404040"/>
+            </a:solidFill>
+          </a:ln>
+        </p:spPr>
+        <p:style>
+          <a:lnRef idx="2">
+            <a:schemeClr val="accent1">
+              <a:shade val="50000"/>
+            </a:schemeClr>
+          </a:lnRef>
+          <a:fillRef idx="1">
+            <a:schemeClr val="accent1"/>
+          </a:fillRef>
+          <a:effectRef idx="0">
+            <a:schemeClr val="accent1"/>
+          </a:effectRef>
+          <a:fontRef idx="minor">
+            <a:schemeClr val="lt1"/>
+          </a:fontRef>
+        </p:style>
+        <p:txBody>
+          <a:bodyPr rtlCol="0" anchor="ctr"/>
+          <a:lstStyle/>
+          <a:p>
+            <a:pPr algn="ctr"/>
+            <a:endParaRPr lang="en-US"/>
+          </a:p>
+        </p:txBody>
+      </p:sp>
+      <p:sp>
+        <p:nvSpPr>
+          <p:cNvPr id="2" name="Título 1">
+            <a:extLst>
+              <a:ext uri="{FF2B5EF4-FFF2-40B4-BE49-F238E27FC236}">
+                <a16:creationId xmlns:a16="http://schemas.microsoft.com/office/drawing/2014/main" id="{ED757065-3E53-45C8-9E5A-41A33C9E8912}"/>
+              </a:ext>
+            </a:extLst>
+          </p:cNvPr>
+          <p:cNvSpPr>
+            <a:spLocks noGrp="1"/>
+          </p:cNvSpPr>
+          <p:nvPr>
+            <p:ph type="title"/>
+          </p:nvPr>
+        </p:nvSpPr>
+        <p:spPr>
+          <a:xfrm>
+            <a:off x="742950" y="742951"/>
+            <a:ext cx="3476625" cy="4962524"/>
+          </a:xfrm>
+        </p:spPr>
+        <p:txBody>
+          <a:bodyPr vert="horz" lIns="91440" tIns="45720" rIns="91440" bIns="45720" rtlCol="0" anchor="ctr">
+            <a:normAutofit/>
+          </a:bodyPr>
+          <a:lstStyle/>
+          <a:p>
+            <a:pPr algn="ctr"/>
+            <a:r>
+              <a:rPr lang="en-US" sz="4800" kern="1200" dirty="0">
+                <a:solidFill>
+                  <a:srgbClr val="FFFFFF"/>
+                </a:solidFill>
+                <a:latin typeface="+mj-lt"/>
+                <a:ea typeface="+mj-ea"/>
+                <a:cs typeface="+mj-cs"/>
+              </a:rPr>
+              <a:t>ROC Curves Comparison</a:t>
+            </a:r>
+          </a:p>
+        </p:txBody>
+      </p:sp>
+      <p:pic>
+        <p:nvPicPr>
+          <p:cNvPr id="6" name="Content Placeholder 4" descr="A close up of a logo&#10;&#10;Description automatically generated">
+            <a:extLst>
+              <a:ext uri="{FF2B5EF4-FFF2-40B4-BE49-F238E27FC236}">
+                <a16:creationId xmlns:a16="http://schemas.microsoft.com/office/drawing/2014/main" id="{6E1C4760-25BD-4CC4-A259-A3CF9D99FCE6}"/>
+              </a:ext>
+            </a:extLst>
+          </p:cNvPr>
+          <p:cNvPicPr>
+            <a:picLocks noGrp="1" noChangeAspect="1"/>
+          </p:cNvPicPr>
+          <p:nvPr>
+            <p:ph idx="1"/>
+          </p:nvPr>
+        </p:nvPicPr>
+        <p:blipFill>
+          <a:blip r:embed="rId2">
+            <a:extLst>
+              <a:ext uri="{28A0092B-C50C-407E-A947-70E740481C1C}">
+                <a14:useLocalDpi xmlns:a14="http://schemas.microsoft.com/office/drawing/2010/main" val="0"/>
+              </a:ext>
+            </a:extLst>
+          </a:blip>
+          <a:stretch>
+            <a:fillRect/>
+          </a:stretch>
+        </p:blipFill>
+        <p:spPr>
+          <a:xfrm>
+            <a:off x="5490196" y="492573"/>
+            <a:ext cx="5880796" cy="5880796"/>
+          </a:xfrm>
+          <a:prstGeom prst="rect">
+            <a:avLst/>
+          </a:prstGeom>
+        </p:spPr>
+      </p:pic>
+    </p:spTree>
+    <p:extLst>
+      <p:ext uri="{BB962C8B-B14F-4D97-AF65-F5344CB8AC3E}">
+        <p14:creationId xmlns:p14="http://schemas.microsoft.com/office/powerpoint/2010/main" val="1268449560"/>
       </p:ext>
     </p:extLst>
   </p:cSld>

</xml_diff>

<commit_message>
añadido referencias en las diapositivas
</commit_message>
<xml_diff>
--- a/Data_Mining.pptx
+++ b/Data_Mining.pptx
@@ -20,6 +20,7 @@
     <p:sldId id="269" r:id="rId14"/>
     <p:sldId id="270" r:id="rId15"/>
     <p:sldId id="271" r:id="rId16"/>
+    <p:sldId id="272" r:id="rId17"/>
   </p:sldIdLst>
   <p:sldSz cx="12192000" cy="6858000"/>
   <p:notesSz cx="6858000" cy="9144000"/>
@@ -15976,7 +15977,7 @@
           <a:p>
             <a:fld id="{FBECE9C9-D874-4E87-A9C2-613A89DA3774}" type="datetimeFigureOut">
               <a:rPr lang="es-ES" smtClean="0"/>
-              <a:t>07/02/2019</a:t>
+              <a:t>08/02/2019</a:t>
             </a:fld>
             <a:endParaRPr lang="es-ES"/>
           </a:p>
@@ -16174,7 +16175,7 @@
           <a:p>
             <a:fld id="{FBECE9C9-D874-4E87-A9C2-613A89DA3774}" type="datetimeFigureOut">
               <a:rPr lang="es-ES" smtClean="0"/>
-              <a:t>07/02/2019</a:t>
+              <a:t>08/02/2019</a:t>
             </a:fld>
             <a:endParaRPr lang="es-ES"/>
           </a:p>
@@ -16382,7 +16383,7 @@
           <a:p>
             <a:fld id="{FBECE9C9-D874-4E87-A9C2-613A89DA3774}" type="datetimeFigureOut">
               <a:rPr lang="es-ES" smtClean="0"/>
-              <a:t>07/02/2019</a:t>
+              <a:t>08/02/2019</a:t>
             </a:fld>
             <a:endParaRPr lang="es-ES"/>
           </a:p>
@@ -16580,7 +16581,7 @@
           <a:p>
             <a:fld id="{FBECE9C9-D874-4E87-A9C2-613A89DA3774}" type="datetimeFigureOut">
               <a:rPr lang="es-ES" smtClean="0"/>
-              <a:t>07/02/2019</a:t>
+              <a:t>08/02/2019</a:t>
             </a:fld>
             <a:endParaRPr lang="es-ES"/>
           </a:p>
@@ -16855,7 +16856,7 @@
           <a:p>
             <a:fld id="{FBECE9C9-D874-4E87-A9C2-613A89DA3774}" type="datetimeFigureOut">
               <a:rPr lang="es-ES" smtClean="0"/>
-              <a:t>07/02/2019</a:t>
+              <a:t>08/02/2019</a:t>
             </a:fld>
             <a:endParaRPr lang="es-ES"/>
           </a:p>
@@ -17120,7 +17121,7 @@
           <a:p>
             <a:fld id="{FBECE9C9-D874-4E87-A9C2-613A89DA3774}" type="datetimeFigureOut">
               <a:rPr lang="es-ES" smtClean="0"/>
-              <a:t>07/02/2019</a:t>
+              <a:t>08/02/2019</a:t>
             </a:fld>
             <a:endParaRPr lang="es-ES"/>
           </a:p>
@@ -17532,7 +17533,7 @@
           <a:p>
             <a:fld id="{FBECE9C9-D874-4E87-A9C2-613A89DA3774}" type="datetimeFigureOut">
               <a:rPr lang="es-ES" smtClean="0"/>
-              <a:t>07/02/2019</a:t>
+              <a:t>08/02/2019</a:t>
             </a:fld>
             <a:endParaRPr lang="es-ES"/>
           </a:p>
@@ -17673,7 +17674,7 @@
           <a:p>
             <a:fld id="{FBECE9C9-D874-4E87-A9C2-613A89DA3774}" type="datetimeFigureOut">
               <a:rPr lang="es-ES" smtClean="0"/>
-              <a:t>07/02/2019</a:t>
+              <a:t>08/02/2019</a:t>
             </a:fld>
             <a:endParaRPr lang="es-ES"/>
           </a:p>
@@ -17786,7 +17787,7 @@
           <a:p>
             <a:fld id="{FBECE9C9-D874-4E87-A9C2-613A89DA3774}" type="datetimeFigureOut">
               <a:rPr lang="es-ES" smtClean="0"/>
-              <a:t>07/02/2019</a:t>
+              <a:t>08/02/2019</a:t>
             </a:fld>
             <a:endParaRPr lang="es-ES"/>
           </a:p>
@@ -18097,7 +18098,7 @@
           <a:p>
             <a:fld id="{FBECE9C9-D874-4E87-A9C2-613A89DA3774}" type="datetimeFigureOut">
               <a:rPr lang="es-ES" smtClean="0"/>
-              <a:t>07/02/2019</a:t>
+              <a:t>08/02/2019</a:t>
             </a:fld>
             <a:endParaRPr lang="es-ES"/>
           </a:p>
@@ -18385,7 +18386,7 @@
           <a:p>
             <a:fld id="{FBECE9C9-D874-4E87-A9C2-613A89DA3774}" type="datetimeFigureOut">
               <a:rPr lang="es-ES" smtClean="0"/>
-              <a:t>07/02/2019</a:t>
+              <a:t>08/02/2019</a:t>
             </a:fld>
             <a:endParaRPr lang="es-ES"/>
           </a:p>
@@ -18626,7 +18627,7 @@
           <a:p>
             <a:fld id="{FBECE9C9-D874-4E87-A9C2-613A89DA3774}" type="datetimeFigureOut">
               <a:rPr lang="es-ES" smtClean="0"/>
-              <a:t>07/02/2019</a:t>
+              <a:t>08/02/2019</a:t>
             </a:fld>
             <a:endParaRPr lang="es-ES"/>
           </a:p>
@@ -22367,6 +22368,623 @@
 </p:sld>
 </file>
 
+<file path=ppt/slides/slide16.xml><?xml version="1.0" encoding="utf-8"?>
+<p:sld xmlns:a="http://schemas.openxmlformats.org/drawingml/2006/main" xmlns:r="http://schemas.openxmlformats.org/officeDocument/2006/relationships" xmlns:p="http://schemas.openxmlformats.org/presentationml/2006/main">
+  <p:cSld>
+    <p:bg>
+      <p:bgPr>
+        <a:solidFill>
+          <a:schemeClr val="bg1"/>
+        </a:solidFill>
+        <a:effectLst/>
+      </p:bgPr>
+    </p:bg>
+    <p:spTree>
+      <p:nvGrpSpPr>
+        <p:cNvPr id="1" name=""/>
+        <p:cNvGrpSpPr/>
+        <p:nvPr/>
+      </p:nvGrpSpPr>
+      <p:grpSpPr>
+        <a:xfrm>
+          <a:off x="0" y="0"/>
+          <a:ext cx="0" cy="0"/>
+          <a:chOff x="0" y="0"/>
+          <a:chExt cx="0" cy="0"/>
+        </a:xfrm>
+      </p:grpSpPr>
+      <p:sp>
+        <p:nvSpPr>
+          <p:cNvPr id="2" name="Título 1">
+            <a:extLst>
+              <a:ext uri="{FF2B5EF4-FFF2-40B4-BE49-F238E27FC236}">
+                <a16:creationId xmlns:a16="http://schemas.microsoft.com/office/drawing/2014/main" id="{64C45D56-9331-4FF3-9D5B-BF393149B4AE}"/>
+              </a:ext>
+            </a:extLst>
+          </p:cNvPr>
+          <p:cNvSpPr>
+            <a:spLocks noGrp="1"/>
+          </p:cNvSpPr>
+          <p:nvPr>
+            <p:ph type="title"/>
+          </p:nvPr>
+        </p:nvSpPr>
+        <p:spPr>
+          <a:xfrm>
+            <a:off x="1136428" y="627564"/>
+            <a:ext cx="7474172" cy="1325563"/>
+          </a:xfrm>
+        </p:spPr>
+        <p:txBody>
+          <a:bodyPr>
+            <a:normAutofit/>
+          </a:bodyPr>
+          <a:lstStyle/>
+          <a:p>
+            <a:r>
+              <a:rPr lang="es-ES"/>
+              <a:t>References</a:t>
+            </a:r>
+          </a:p>
+        </p:txBody>
+      </p:sp>
+      <p:sp>
+        <p:nvSpPr>
+          <p:cNvPr id="3" name="Marcador de contenido 2">
+            <a:extLst>
+              <a:ext uri="{FF2B5EF4-FFF2-40B4-BE49-F238E27FC236}">
+                <a16:creationId xmlns:a16="http://schemas.microsoft.com/office/drawing/2014/main" id="{38B77B09-716B-401C-8C06-54031B223E1C}"/>
+              </a:ext>
+            </a:extLst>
+          </p:cNvPr>
+          <p:cNvSpPr>
+            <a:spLocks noGrp="1"/>
+          </p:cNvSpPr>
+          <p:nvPr>
+            <p:ph idx="1"/>
+          </p:nvPr>
+        </p:nvSpPr>
+        <p:spPr>
+          <a:xfrm>
+            <a:off x="1136429" y="2278173"/>
+            <a:ext cx="6467867" cy="3450613"/>
+          </a:xfrm>
+        </p:spPr>
+        <p:txBody>
+          <a:bodyPr anchor="ctr">
+            <a:normAutofit/>
+          </a:bodyPr>
+          <a:lstStyle/>
+          <a:p>
+            <a:r>
+              <a:rPr lang="en-US" sz="1100" dirty="0"/>
+              <a:t>Sarah Hewitt, T. </a:t>
+            </a:r>
+            <a:r>
+              <a:rPr lang="en-US" sz="1100" dirty="0" err="1"/>
+              <a:t>Tiropanis</a:t>
+            </a:r>
+            <a:r>
+              <a:rPr lang="en-US" sz="1100" dirty="0"/>
+              <a:t>, and C. </a:t>
+            </a:r>
+            <a:r>
+              <a:rPr lang="en-US" sz="1100" dirty="0" err="1"/>
+              <a:t>Bokhove</a:t>
+            </a:r>
+            <a:r>
+              <a:rPr lang="en-US" sz="1100" dirty="0"/>
+              <a:t>. 2016. The Problem </a:t>
+            </a:r>
+            <a:r>
+              <a:rPr lang="en-US" sz="1100" dirty="0" err="1"/>
+              <a:t>ofIdentifying</a:t>
+            </a:r>
+            <a:r>
+              <a:rPr lang="en-US" sz="1100" dirty="0"/>
+              <a:t> Misogynist Language on Twitter (and Other Online </a:t>
+            </a:r>
+            <a:r>
+              <a:rPr lang="en-US" sz="1100" dirty="0" err="1"/>
+              <a:t>SocialSpaces</a:t>
+            </a:r>
+            <a:r>
+              <a:rPr lang="en-US" sz="1100" dirty="0"/>
+              <a:t>). In Proceedings of the 8th ACM Conference on Web Science (Web-Sci ’16). ACM, New York, NY, USA, 333–335. </a:t>
+            </a:r>
+            <a:r>
+              <a:rPr lang="en-US" sz="1100" dirty="0">
+                <a:hlinkClick r:id="rId2"/>
+              </a:rPr>
+              <a:t>https://doi.org/10.1145/2908131.2908183</a:t>
+            </a:r>
+            <a:endParaRPr lang="en-US" sz="1100" dirty="0"/>
+          </a:p>
+          <a:p>
+            <a:r>
+              <a:rPr lang="en-US" sz="1100" dirty="0" err="1"/>
+              <a:t>Efthymios</a:t>
+            </a:r>
+            <a:r>
+              <a:rPr lang="en-US" sz="1100" dirty="0"/>
+              <a:t> </a:t>
+            </a:r>
+            <a:r>
+              <a:rPr lang="en-US" sz="1100" dirty="0" err="1"/>
+              <a:t>Kouloumpis</a:t>
+            </a:r>
+            <a:r>
+              <a:rPr lang="en-US" sz="1100" dirty="0"/>
+              <a:t>, Theresa Wilson, and Johanna D Moore. 2011.Twitter sentiment analysis: The good the bad and the omg! </a:t>
+            </a:r>
+            <a:r>
+              <a:rPr lang="en-US" sz="1100" dirty="0" err="1"/>
+              <a:t>Icwsm</a:t>
+            </a:r>
+            <a:r>
+              <a:rPr lang="en-US" sz="1100" dirty="0"/>
+              <a:t> 11,538-541 (2011), 164.</a:t>
+            </a:r>
+          </a:p>
+          <a:p>
+            <a:r>
+              <a:rPr lang="es-ES" sz="1100" dirty="0"/>
+              <a:t>Dr. James </a:t>
+            </a:r>
+            <a:r>
+              <a:rPr lang="es-ES" sz="1100" dirty="0" err="1"/>
+              <a:t>Lani</a:t>
+            </a:r>
+            <a:r>
+              <a:rPr lang="es-ES" sz="1100" dirty="0"/>
+              <a:t>. 2016. </a:t>
+            </a:r>
+            <a:r>
+              <a:rPr lang="es-ES" sz="1100" dirty="0" err="1"/>
+              <a:t>What</a:t>
+            </a:r>
+            <a:r>
+              <a:rPr lang="es-ES" sz="1100" dirty="0"/>
+              <a:t> </a:t>
+            </a:r>
+            <a:r>
+              <a:rPr lang="es-ES" sz="1100" dirty="0" err="1"/>
+              <a:t>is</a:t>
+            </a:r>
+            <a:r>
+              <a:rPr lang="es-ES" sz="1100" dirty="0"/>
+              <a:t> </a:t>
+            </a:r>
+            <a:r>
+              <a:rPr lang="es-ES" sz="1100" dirty="0" err="1"/>
+              <a:t>Logistic</a:t>
+            </a:r>
+            <a:r>
+              <a:rPr lang="es-ES" sz="1100" dirty="0"/>
+              <a:t> </a:t>
+            </a:r>
+            <a:r>
+              <a:rPr lang="es-ES" sz="1100" dirty="0" err="1"/>
+              <a:t>Regression</a:t>
+            </a:r>
+            <a:r>
+              <a:rPr lang="es-ES" sz="1100" dirty="0"/>
+              <a:t>? </a:t>
+            </a:r>
+            <a:r>
+              <a:rPr lang="es-ES" sz="1100" dirty="0" err="1"/>
+              <a:t>CompleteDissertation</a:t>
+            </a:r>
+            <a:r>
+              <a:rPr lang="es-ES" sz="1100" dirty="0"/>
+              <a:t> (2016). </a:t>
+            </a:r>
+            <a:r>
+              <a:rPr lang="es-ES" sz="1100" dirty="0">
+                <a:hlinkClick r:id="rId3"/>
+              </a:rPr>
+              <a:t>https://www.statisticssolutions.com/what-is-logistic-regression/</a:t>
+            </a:r>
+            <a:endParaRPr lang="es-ES" sz="1100" dirty="0"/>
+          </a:p>
+          <a:p>
+            <a:r>
+              <a:rPr lang="en-US" sz="1100" dirty="0"/>
+              <a:t>Sara Rosenthal, </a:t>
+            </a:r>
+            <a:r>
+              <a:rPr lang="en-US" sz="1100" dirty="0" err="1"/>
+              <a:t>Noura</a:t>
+            </a:r>
+            <a:r>
+              <a:rPr lang="en-US" sz="1100" dirty="0"/>
+              <a:t> </a:t>
+            </a:r>
+            <a:r>
+              <a:rPr lang="en-US" sz="1100" dirty="0" err="1"/>
+              <a:t>Farra</a:t>
+            </a:r>
+            <a:r>
+              <a:rPr lang="en-US" sz="1100" dirty="0"/>
+              <a:t>, and </a:t>
+            </a:r>
+            <a:r>
+              <a:rPr lang="en-US" sz="1100" dirty="0" err="1"/>
+              <a:t>Preslav</a:t>
+            </a:r>
+            <a:r>
+              <a:rPr lang="en-US" sz="1100" dirty="0"/>
+              <a:t> </a:t>
+            </a:r>
+            <a:r>
+              <a:rPr lang="en-US" sz="1100" dirty="0" err="1"/>
+              <a:t>Nakov</a:t>
+            </a:r>
+            <a:r>
+              <a:rPr lang="en-US" sz="1100" dirty="0"/>
+              <a:t>. 2017. SemEval-2017 task 4: Sentiment analysis in Twitter. In Proceedings of the 11th International Workshop on Semantic Evaluation (SemEval-2017). 502–518.</a:t>
+            </a:r>
+          </a:p>
+          <a:p>
+            <a:r>
+              <a:rPr lang="en-US" sz="1100" dirty="0" err="1"/>
+              <a:t>Nishtha</a:t>
+            </a:r>
+            <a:r>
+              <a:rPr lang="en-US" sz="1100" dirty="0"/>
+              <a:t> Saxena. 2018. Text Mining and Sentiment Analysis - A </a:t>
+            </a:r>
+            <a:r>
+              <a:rPr lang="en-US" sz="1100" dirty="0" err="1"/>
+              <a:t>Primer.Data</a:t>
+            </a:r>
+            <a:r>
+              <a:rPr lang="en-US" sz="1100" dirty="0"/>
+              <a:t> Science Central (2018). </a:t>
+            </a:r>
+            <a:r>
+              <a:rPr lang="en-US" sz="1100" dirty="0">
+                <a:hlinkClick r:id="rId4"/>
+              </a:rPr>
+              <a:t>https://www.datasciencecentral.com/profiles/blogs/text-mining-and-sentiment-analyses-a-primer</a:t>
+            </a:r>
+            <a:endParaRPr lang="en-US" sz="1100" dirty="0"/>
+          </a:p>
+          <a:p>
+            <a:r>
+              <a:rPr lang="en-US" sz="1100" dirty="0"/>
+              <a:t>George </a:t>
+            </a:r>
+            <a:r>
+              <a:rPr lang="en-US" sz="1100" dirty="0" err="1"/>
+              <a:t>Seif</a:t>
+            </a:r>
+            <a:r>
+              <a:rPr lang="en-US" sz="1100" dirty="0"/>
+              <a:t>. 2018. 5 Types of Regression and their </a:t>
+            </a:r>
+            <a:r>
+              <a:rPr lang="en-US" sz="1100" dirty="0" err="1"/>
+              <a:t>properties.Towards</a:t>
+            </a:r>
+            <a:r>
+              <a:rPr lang="en-US" sz="1100" dirty="0"/>
+              <a:t> Data Science (2018). </a:t>
+            </a:r>
+            <a:r>
+              <a:rPr lang="en-US" sz="1100" dirty="0">
+                <a:hlinkClick r:id="rId5"/>
+              </a:rPr>
+              <a:t>https://towardsdatascience.com/5-types-of-regression-and-their-properties-c5e1fa12d55e</a:t>
+            </a:r>
+            <a:endParaRPr lang="en-US" sz="1100" dirty="0"/>
+          </a:p>
+          <a:p>
+            <a:r>
+              <a:rPr lang="es-ES" sz="1100" dirty="0" err="1"/>
+              <a:t>Sanjana</a:t>
+            </a:r>
+            <a:r>
+              <a:rPr lang="es-ES" sz="1100" dirty="0"/>
+              <a:t> Sharma, </a:t>
+            </a:r>
+            <a:r>
+              <a:rPr lang="es-ES" sz="1100" dirty="0" err="1"/>
+              <a:t>Saksham</a:t>
+            </a:r>
+            <a:r>
+              <a:rPr lang="es-ES" sz="1100" dirty="0"/>
+              <a:t> </a:t>
+            </a:r>
+            <a:r>
+              <a:rPr lang="es-ES" sz="1100" dirty="0" err="1"/>
+              <a:t>Agrawal</a:t>
+            </a:r>
+            <a:r>
+              <a:rPr lang="es-ES" sz="1100" dirty="0"/>
+              <a:t>, and </a:t>
+            </a:r>
+            <a:r>
+              <a:rPr lang="es-ES" sz="1100" dirty="0" err="1"/>
+              <a:t>Manish</a:t>
+            </a:r>
+            <a:r>
+              <a:rPr lang="es-ES" sz="1100" dirty="0"/>
+              <a:t> </a:t>
+            </a:r>
+            <a:r>
+              <a:rPr lang="es-ES" sz="1100" dirty="0" err="1"/>
+              <a:t>Shrivastava</a:t>
+            </a:r>
+            <a:r>
+              <a:rPr lang="es-ES" sz="1100" dirty="0"/>
+              <a:t>. 2018. </a:t>
+            </a:r>
+            <a:r>
+              <a:rPr lang="es-ES" sz="1100" dirty="0" err="1"/>
+              <a:t>Degree</a:t>
+            </a:r>
+            <a:r>
+              <a:rPr lang="es-ES" sz="1100" dirty="0"/>
+              <a:t> </a:t>
+            </a:r>
+            <a:r>
+              <a:rPr lang="es-ES" sz="1100" dirty="0" err="1"/>
+              <a:t>based</a:t>
+            </a:r>
+            <a:r>
+              <a:rPr lang="es-ES" sz="1100" dirty="0"/>
+              <a:t> </a:t>
+            </a:r>
+            <a:r>
+              <a:rPr lang="es-ES" sz="1100" dirty="0" err="1"/>
+              <a:t>Classification</a:t>
+            </a:r>
+            <a:r>
+              <a:rPr lang="es-ES" sz="1100" dirty="0"/>
+              <a:t> </a:t>
+            </a:r>
+            <a:r>
+              <a:rPr lang="es-ES" sz="1100" dirty="0" err="1"/>
+              <a:t>of</a:t>
+            </a:r>
+            <a:r>
+              <a:rPr lang="es-ES" sz="1100" dirty="0"/>
+              <a:t> </a:t>
+            </a:r>
+            <a:r>
+              <a:rPr lang="es-ES" sz="1100" dirty="0" err="1"/>
+              <a:t>Harmful</a:t>
+            </a:r>
+            <a:r>
+              <a:rPr lang="es-ES" sz="1100" dirty="0"/>
+              <a:t> </a:t>
+            </a:r>
+            <a:r>
+              <a:rPr lang="es-ES" sz="1100" dirty="0" err="1"/>
+              <a:t>Speech</a:t>
+            </a:r>
+            <a:r>
+              <a:rPr lang="es-ES" sz="1100" dirty="0"/>
+              <a:t> </a:t>
+            </a:r>
+            <a:r>
+              <a:rPr lang="es-ES" sz="1100" dirty="0" err="1"/>
+              <a:t>using</a:t>
+            </a:r>
+            <a:r>
+              <a:rPr lang="es-ES" sz="1100" dirty="0"/>
+              <a:t> Twitter Data. </a:t>
+            </a:r>
+            <a:r>
+              <a:rPr lang="es-ES" sz="1100" dirty="0" err="1"/>
+              <a:t>CoRR</a:t>
+            </a:r>
+            <a:r>
+              <a:rPr lang="es-ES" sz="1100" dirty="0"/>
+              <a:t> </a:t>
+            </a:r>
+            <a:r>
+              <a:rPr lang="es-ES" sz="1100" dirty="0" err="1"/>
+              <a:t>abs</a:t>
+            </a:r>
+            <a:r>
+              <a:rPr lang="es-ES" sz="1100" dirty="0"/>
+              <a:t>/1806.04197 (2018). arXiv:1806.04197 </a:t>
+            </a:r>
+            <a:r>
+              <a:rPr lang="es-ES" sz="1100" dirty="0">
+                <a:hlinkClick r:id="rId6"/>
+              </a:rPr>
+              <a:t>http://arxiv.org/abs/1806.04197</a:t>
+            </a:r>
+            <a:endParaRPr lang="es-ES" sz="1100" dirty="0"/>
+          </a:p>
+          <a:p>
+            <a:endParaRPr lang="es-ES" sz="1100" dirty="0"/>
+          </a:p>
+        </p:txBody>
+      </p:sp>
+      <p:sp>
+        <p:nvSpPr>
+          <p:cNvPr id="14" name="Rectangle 9">
+            <a:extLst>
+              <a:ext uri="{FF2B5EF4-FFF2-40B4-BE49-F238E27FC236}">
+                <a16:creationId xmlns:a16="http://schemas.microsoft.com/office/drawing/2014/main" id="{59A309A7-1751-4ABE-A3C1-EEC40366AD89}"/>
+              </a:ext>
+              <a:ext uri="{C183D7F6-B498-43B3-948B-1728B52AA6E4}">
+                <adec:decorative xmlns:adec="http://schemas.microsoft.com/office/drawing/2017/decorative" val="1"/>
+              </a:ext>
+            </a:extLst>
+          </p:cNvPr>
+          <p:cNvSpPr>
+            <a:spLocks noGrp="1" noRot="1" noChangeAspect="1" noMove="1" noResize="1" noEditPoints="1" noAdjustHandles="1" noChangeArrowheads="1" noChangeShapeType="1" noTextEdit="1"/>
+          </p:cNvSpPr>
+          <p:nvPr>
+            <p:extLst>
+              <p:ext uri="{386F3935-93C4-4BCD-93E2-E3B085C9AB24}">
+                <p16:designElem xmlns:p16="http://schemas.microsoft.com/office/powerpoint/2015/main" val="1"/>
+              </p:ext>
+            </p:extLst>
+          </p:nvPr>
+        </p:nvSpPr>
+        <p:spPr>
+          <a:xfrm>
+            <a:off x="10088880" y="0"/>
+            <a:ext cx="2103120" cy="6858000"/>
+          </a:xfrm>
+          <a:prstGeom prst="rect">
+            <a:avLst/>
+          </a:prstGeom>
+          <a:solidFill>
+            <a:schemeClr val="accent1"/>
+          </a:solidFill>
+          <a:ln>
+            <a:noFill/>
+          </a:ln>
+        </p:spPr>
+        <p:style>
+          <a:lnRef idx="2">
+            <a:schemeClr val="accent1">
+              <a:shade val="50000"/>
+            </a:schemeClr>
+          </a:lnRef>
+          <a:fillRef idx="1">
+            <a:schemeClr val="accent1"/>
+          </a:fillRef>
+          <a:effectRef idx="0">
+            <a:schemeClr val="accent1"/>
+          </a:effectRef>
+          <a:fontRef idx="minor">
+            <a:schemeClr val="lt1"/>
+          </a:fontRef>
+        </p:style>
+        <p:txBody>
+          <a:bodyPr rtlCol="0" anchor="ctr"/>
+          <a:lstStyle/>
+          <a:p>
+            <a:pPr algn="ctr"/>
+            <a:endParaRPr lang="en-US"/>
+          </a:p>
+        </p:txBody>
+      </p:sp>
+      <p:sp>
+        <p:nvSpPr>
+          <p:cNvPr id="15" name="Oval 11">
+            <a:extLst>
+              <a:ext uri="{FF2B5EF4-FFF2-40B4-BE49-F238E27FC236}">
+                <a16:creationId xmlns:a16="http://schemas.microsoft.com/office/drawing/2014/main" id="{967D8EB6-EAE1-4F9C-B398-83321E287204}"/>
+              </a:ext>
+              <a:ext uri="{C183D7F6-B498-43B3-948B-1728B52AA6E4}">
+                <adec:decorative xmlns:adec="http://schemas.microsoft.com/office/drawing/2017/decorative" val="1"/>
+              </a:ext>
+            </a:extLst>
+          </p:cNvPr>
+          <p:cNvSpPr>
+            <a:spLocks noGrp="1" noRot="1" noChangeAspect="1" noMove="1" noResize="1" noEditPoints="1" noAdjustHandles="1" noChangeArrowheads="1" noChangeShapeType="1" noTextEdit="1"/>
+          </p:cNvSpPr>
+          <p:nvPr>
+            <p:extLst>
+              <p:ext uri="{386F3935-93C4-4BCD-93E2-E3B085C9AB24}">
+                <p16:designElem xmlns:p16="http://schemas.microsoft.com/office/powerpoint/2015/main" val="1"/>
+              </p:ext>
+            </p:extLst>
+          </p:nvPr>
+        </p:nvSpPr>
+        <p:spPr>
+          <a:xfrm>
+            <a:off x="8915400" y="2358913"/>
+            <a:ext cx="2140172" cy="2140172"/>
+          </a:xfrm>
+          <a:prstGeom prst="ellipse">
+            <a:avLst/>
+          </a:prstGeom>
+          <a:solidFill>
+            <a:srgbClr val="FFFFFF"/>
+          </a:solidFill>
+          <a:ln w="22225">
+            <a:solidFill>
+              <a:schemeClr val="accent1"/>
+            </a:solidFill>
+          </a:ln>
+        </p:spPr>
+        <p:style>
+          <a:lnRef idx="2">
+            <a:schemeClr val="accent1">
+              <a:shade val="50000"/>
+            </a:schemeClr>
+          </a:lnRef>
+          <a:fillRef idx="1">
+            <a:schemeClr val="accent1"/>
+          </a:fillRef>
+          <a:effectRef idx="0">
+            <a:schemeClr val="accent1"/>
+          </a:effectRef>
+          <a:fontRef idx="minor">
+            <a:schemeClr val="lt1"/>
+          </a:fontRef>
+        </p:style>
+        <p:txBody>
+          <a:bodyPr rtlCol="0" anchor="ctr"/>
+          <a:lstStyle/>
+          <a:p>
+            <a:pPr algn="ctr"/>
+            <a:endParaRPr lang="en-US"/>
+          </a:p>
+        </p:txBody>
+      </p:sp>
+      <p:pic>
+        <p:nvPicPr>
+          <p:cNvPr id="16" name="Graphic 6">
+            <a:extLst>
+              <a:ext uri="{FF2B5EF4-FFF2-40B4-BE49-F238E27FC236}">
+                <a16:creationId xmlns:a16="http://schemas.microsoft.com/office/drawing/2014/main" id="{270FB966-D800-4559-BE2E-27FC83E568B6}"/>
+              </a:ext>
+            </a:extLst>
+          </p:cNvPr>
+          <p:cNvPicPr>
+            <a:picLocks noChangeAspect="1"/>
+          </p:cNvPicPr>
+          <p:nvPr/>
+        </p:nvPicPr>
+        <p:blipFill>
+          <a:blip r:embed="rId7">
+            <a:extLst>
+              <a:ext uri="{28A0092B-C50C-407E-A947-70E740481C1C}">
+                <a14:useLocalDpi xmlns:a14="http://schemas.microsoft.com/office/drawing/2010/main" val="0"/>
+              </a:ext>
+              <a:ext uri="{96DAC541-7B7A-43D3-8B79-37D633B846F1}">
+                <asvg:svgBlip xmlns:asvg="http://schemas.microsoft.com/office/drawing/2016/SVG/main" r:embed="rId8"/>
+              </a:ext>
+            </a:extLst>
+          </a:blip>
+          <a:stretch>
+            <a:fillRect/>
+          </a:stretch>
+        </p:blipFill>
+        <p:spPr>
+          <a:xfrm>
+            <a:off x="9413987" y="2857501"/>
+            <a:ext cx="1142998" cy="1142998"/>
+          </a:xfrm>
+          <a:prstGeom prst="rect">
+            <a:avLst/>
+          </a:prstGeom>
+        </p:spPr>
+      </p:pic>
+    </p:spTree>
+    <p:extLst>
+      <p:ext uri="{BB962C8B-B14F-4D97-AF65-F5344CB8AC3E}">
+        <p14:creationId xmlns:p14="http://schemas.microsoft.com/office/powerpoint/2010/main" val="888095132"/>
+      </p:ext>
+    </p:extLst>
+  </p:cSld>
+  <p:clrMapOvr>
+    <a:masterClrMapping/>
+  </p:clrMapOvr>
+</p:sld>
+</file>
+
 <file path=ppt/slides/slide2.xml><?xml version="1.0" encoding="utf-8"?>
 <p:sld xmlns:a="http://schemas.openxmlformats.org/drawingml/2006/main" xmlns:r="http://schemas.openxmlformats.org/officeDocument/2006/relationships" xmlns:p="http://schemas.openxmlformats.org/presentationml/2006/main">
   <p:cSld>

</xml_diff>